<commit_message>
resultats récupérés, ppt update
</commit_message>
<xml_diff>
--- a/presentation.pptx
+++ b/presentation.pptx
@@ -8,7 +8,7 @@
     <p:sldMasterId id="2147484023" r:id="rId5"/>
   </p:sldMasterIdLst>
   <p:notesMasterIdLst>
-    <p:notesMasterId r:id="rId14"/>
+    <p:notesMasterId r:id="rId15"/>
   </p:notesMasterIdLst>
   <p:sldIdLst>
     <p:sldId id="256" r:id="rId6"/>
@@ -17,8 +17,9 @@
     <p:sldId id="261" r:id="rId9"/>
     <p:sldId id="259" r:id="rId10"/>
     <p:sldId id="260" r:id="rId11"/>
-    <p:sldId id="262" r:id="rId12"/>
-    <p:sldId id="263" r:id="rId13"/>
+    <p:sldId id="264" r:id="rId12"/>
+    <p:sldId id="262" r:id="rId13"/>
+    <p:sldId id="263" r:id="rId14"/>
   </p:sldIdLst>
   <p:sldSz cx="12192000" cy="6858000"/>
   <p:notesSz cx="6858000" cy="9144000"/>
@@ -119,7 +120,7 @@
   </p:defaultTextStyle>
   <p:extLst>
     <p:ext uri="{EFAFB233-063F-42B5-8137-9DF3F51BA10A}">
-      <p15:sldGuideLst xmlns:p15="http://schemas.microsoft.com/office/powerpoint/2012/main" xmlns="">
+      <p15:sldGuideLst xmlns:p15="http://schemas.microsoft.com/office/powerpoint/2012/main">
         <p15:guide id="1" orient="horz" pos="2160">
           <p15:clr>
             <a:srgbClr val="A4A3A4"/>
@@ -133,7 +134,7 @@
       </p15:sldGuideLst>
     </p:ext>
     <p:ext uri="{2D200454-40CA-4A62-9FC3-DE9A4176ACB9}">
-      <p15:notesGuideLst xmlns:p15="http://schemas.microsoft.com/office/powerpoint/2012/main" xmlns="">
+      <p15:notesGuideLst xmlns:p15="http://schemas.microsoft.com/office/powerpoint/2012/main">
         <p15:guide id="1" orient="horz" pos="2880">
           <p15:clr>
             <a:srgbClr val="A4A3A4"/>
@@ -151,8 +152,18 @@
 </file>
 
 <file path=ppt/charts/chart1.xml><?xml version="1.0" encoding="utf-8"?>
-<c:chartSpace xmlns:c="http://schemas.openxmlformats.org/drawingml/2006/chart" xmlns:a="http://schemas.openxmlformats.org/drawingml/2006/main" xmlns:r="http://schemas.openxmlformats.org/officeDocument/2006/relationships">
+<c:chartSpace xmlns:c="http://schemas.openxmlformats.org/drawingml/2006/chart" xmlns:a="http://schemas.openxmlformats.org/drawingml/2006/main" xmlns:r="http://schemas.openxmlformats.org/officeDocument/2006/relationships" xmlns:c16r2="http://schemas.microsoft.com/office/drawing/2015/06/chart">
+  <c:date1904 val="0"/>
   <c:lang val="fr-FR"/>
+  <c:roundedCorners val="0"/>
+  <mc:AlternateContent xmlns:mc="http://schemas.openxmlformats.org/markup-compatibility/2006">
+    <mc:Choice xmlns:c14="http://schemas.microsoft.com/office/drawing/2007/8/2/chart" Requires="c14">
+      <c14:style val="102"/>
+    </mc:Choice>
+    <mc:Fallback>
+      <c:style val="2"/>
+    </mc:Fallback>
+  </mc:AlternateContent>
   <c:chart>
     <c:title>
       <c:tx>
@@ -189,7 +200,7 @@
           </a:p>
         </c:rich>
       </c:tx>
-      <c:layout/>
+      <c:overlay val="0"/>
       <c:spPr>
         <a:noFill/>
         <a:ln>
@@ -198,10 +209,12 @@
         <a:effectLst/>
       </c:spPr>
     </c:title>
+    <c:autoTitleDeleted val="0"/>
     <c:plotArea>
       <c:layout/>
       <c:lineChart>
         <c:grouping val="standard"/>
+        <c:varyColors val="0"/>
         <c:ser>
           <c:idx val="1"/>
           <c:order val="0"/>
@@ -268,14 +281,22 @@
               </c:numCache>
             </c:numRef>
           </c:val>
-          <c:extLst xmlns:c16r2="http://schemas.microsoft.com/office/drawing/2015/06/chart">
+          <c:smooth val="0"/>
+          <c:extLst>
             <c:ext xmlns:c16="http://schemas.microsoft.com/office/drawing/2014/chart" uri="{C3380CC4-5D6E-409C-BE32-E72D297353CC}">
               <c16:uniqueId val="{00000000-EF17-4B01-8E48-F15C6C6E8E5B}"/>
             </c:ext>
           </c:extLst>
         </c:ser>
-        <c:dLbls/>
-        <c:marker val="1"/>
+        <c:dLbls>
+          <c:showLegendKey val="0"/>
+          <c:showVal val="0"/>
+          <c:showCatName val="0"/>
+          <c:showSerName val="0"/>
+          <c:showPercent val="0"/>
+          <c:showBubbleSize val="0"/>
+        </c:dLbls>
+        <c:smooth val="0"/>
         <c:axId val="118685056"/>
         <c:axId val="112526464"/>
       </c:lineChart>
@@ -284,9 +305,11 @@
         <c:scaling>
           <c:orientation val="minMax"/>
         </c:scaling>
+        <c:delete val="0"/>
         <c:axPos val="b"/>
         <c:numFmt formatCode="General" sourceLinked="1"/>
         <c:majorTickMark val="none"/>
+        <c:minorTickMark val="none"/>
         <c:tickLblPos val="nextTo"/>
         <c:spPr>
           <a:noFill/>
@@ -326,12 +349,14 @@
         <c:auto val="1"/>
         <c:lblAlgn val="ctr"/>
         <c:lblOffset val="100"/>
+        <c:noMultiLvlLbl val="0"/>
       </c:catAx>
       <c:valAx>
         <c:axId val="112526464"/>
         <c:scaling>
           <c:orientation val="minMax"/>
         </c:scaling>
+        <c:delete val="0"/>
         <c:axPos val="l"/>
         <c:majorGridlines>
           <c:spPr>
@@ -349,6 +374,7 @@
         </c:majorGridlines>
         <c:numFmt formatCode="#,##0.00" sourceLinked="0"/>
         <c:majorTickMark val="none"/>
+        <c:minorTickMark val="none"/>
         <c:tickLblPos val="nextTo"/>
         <c:spPr>
           <a:noFill/>
@@ -391,7 +417,7 @@
     </c:plotArea>
     <c:legend>
       <c:legendPos val="b"/>
-      <c:layout/>
+      <c:overlay val="0"/>
       <c:spPr>
         <a:noFill/>
         <a:ln>
@@ -422,6 +448,7 @@
     </c:legend>
     <c:plotVisOnly val="1"/>
     <c:dispBlanksAs val="gap"/>
+    <c:showDLblsOverMax val="0"/>
   </c:chart>
   <c:spPr>
     <a:noFill/>
@@ -440,564 +467,10 @@
       <a:endParaRPr lang="fr-FR"/>
     </a:p>
   </c:txPr>
-  <c:externalData r:id="rId1"/>
+  <c:externalData r:id="rId1">
+    <c:autoUpdate val="0"/>
+  </c:externalData>
 </c:chartSpace>
-</file>
-
-<file path=ppt/charts/colors1.xml><?xml version="1.0" encoding="utf-8"?>
-<cs:colorStyle xmlns:cs="http://schemas.microsoft.com/office/drawing/2012/chartStyle" xmlns:a="http://schemas.openxmlformats.org/drawingml/2006/main" meth="cycle" id="10">
-  <a:schemeClr val="accent1"/>
-  <a:schemeClr val="accent2"/>
-  <a:schemeClr val="accent3"/>
-  <a:schemeClr val="accent4"/>
-  <a:schemeClr val="accent5"/>
-  <a:schemeClr val="accent6"/>
-  <cs:variation/>
-  <cs:variation>
-    <a:lumMod val="60000"/>
-  </cs:variation>
-  <cs:variation>
-    <a:lumMod val="80000"/>
-    <a:lumOff val="20000"/>
-  </cs:variation>
-  <cs:variation>
-    <a:lumMod val="80000"/>
-  </cs:variation>
-  <cs:variation>
-    <a:lumMod val="60000"/>
-    <a:lumOff val="40000"/>
-  </cs:variation>
-  <cs:variation>
-    <a:lumMod val="50000"/>
-  </cs:variation>
-  <cs:variation>
-    <a:lumMod val="70000"/>
-    <a:lumOff val="30000"/>
-  </cs:variation>
-  <cs:variation>
-    <a:lumMod val="70000"/>
-  </cs:variation>
-  <cs:variation>
-    <a:lumMod val="50000"/>
-    <a:lumOff val="50000"/>
-  </cs:variation>
-</cs:colorStyle>
-</file>
-
-<file path=ppt/charts/style1.xml><?xml version="1.0" encoding="utf-8"?>
-<cs:chartStyle xmlns:cs="http://schemas.microsoft.com/office/drawing/2012/chartStyle" xmlns:a="http://schemas.openxmlformats.org/drawingml/2006/main" id="227">
-  <cs:axisTitle>
-    <cs:lnRef idx="0"/>
-    <cs:fillRef idx="0"/>
-    <cs:effectRef idx="0"/>
-    <cs:fontRef idx="minor">
-      <a:schemeClr val="tx1">
-        <a:lumMod val="65000"/>
-        <a:lumOff val="35000"/>
-      </a:schemeClr>
-    </cs:fontRef>
-    <cs:defRPr sz="1000" kern="1200"/>
-  </cs:axisTitle>
-  <cs:categoryAxis>
-    <cs:lnRef idx="0"/>
-    <cs:fillRef idx="0"/>
-    <cs:effectRef idx="0"/>
-    <cs:fontRef idx="minor">
-      <a:schemeClr val="tx1">
-        <a:lumMod val="65000"/>
-        <a:lumOff val="35000"/>
-      </a:schemeClr>
-    </cs:fontRef>
-    <cs:spPr>
-      <a:ln w="9525" cap="flat" cmpd="sng" algn="ctr">
-        <a:solidFill>
-          <a:schemeClr val="tx1">
-            <a:lumMod val="15000"/>
-            <a:lumOff val="85000"/>
-          </a:schemeClr>
-        </a:solidFill>
-        <a:round/>
-      </a:ln>
-    </cs:spPr>
-    <cs:defRPr sz="900" kern="1200"/>
-  </cs:categoryAxis>
-  <cs:chartArea mods="allowNoFillOverride allowNoLineOverride">
-    <cs:lnRef idx="0"/>
-    <cs:fillRef idx="0"/>
-    <cs:effectRef idx="0"/>
-    <cs:fontRef idx="minor">
-      <a:schemeClr val="tx1"/>
-    </cs:fontRef>
-    <cs:spPr>
-      <a:solidFill>
-        <a:schemeClr val="bg1"/>
-      </a:solidFill>
-      <a:ln w="9525" cap="flat" cmpd="sng" algn="ctr">
-        <a:solidFill>
-          <a:schemeClr val="tx1">
-            <a:lumMod val="15000"/>
-            <a:lumOff val="85000"/>
-          </a:schemeClr>
-        </a:solidFill>
-        <a:round/>
-      </a:ln>
-    </cs:spPr>
-    <cs:defRPr sz="1000" kern="1200"/>
-  </cs:chartArea>
-  <cs:dataLabel>
-    <cs:lnRef idx="0"/>
-    <cs:fillRef idx="0"/>
-    <cs:effectRef idx="0"/>
-    <cs:fontRef idx="minor">
-      <a:schemeClr val="tx1">
-        <a:lumMod val="75000"/>
-        <a:lumOff val="25000"/>
-      </a:schemeClr>
-    </cs:fontRef>
-    <cs:defRPr sz="900" kern="1200"/>
-  </cs:dataLabel>
-  <cs:dataLabelCallout>
-    <cs:lnRef idx="0"/>
-    <cs:fillRef idx="0"/>
-    <cs:effectRef idx="0"/>
-    <cs:fontRef idx="minor">
-      <a:schemeClr val="dk1">
-        <a:lumMod val="65000"/>
-        <a:lumOff val="35000"/>
-      </a:schemeClr>
-    </cs:fontRef>
-    <cs:spPr>
-      <a:solidFill>
-        <a:schemeClr val="lt1"/>
-      </a:solidFill>
-      <a:ln>
-        <a:solidFill>
-          <a:schemeClr val="dk1">
-            <a:lumMod val="25000"/>
-            <a:lumOff val="75000"/>
-          </a:schemeClr>
-        </a:solidFill>
-      </a:ln>
-    </cs:spPr>
-    <cs:defRPr sz="900" kern="1200"/>
-    <cs:bodyPr rot="0" spcFirstLastPara="1" vertOverflow="clip" horzOverflow="clip" vert="horz" wrap="square" lIns="36576" tIns="18288" rIns="36576" bIns="18288" anchor="ctr" anchorCtr="1">
-      <a:spAutoFit/>
-    </cs:bodyPr>
-  </cs:dataLabelCallout>
-  <cs:dataPoint>
-    <cs:lnRef idx="0"/>
-    <cs:fillRef idx="1">
-      <cs:styleClr val="auto"/>
-    </cs:fillRef>
-    <cs:effectRef idx="0"/>
-    <cs:fontRef idx="minor">
-      <a:schemeClr val="tx1"/>
-    </cs:fontRef>
-    <cs:spPr>
-      <a:solidFill>
-        <a:schemeClr val="phClr"/>
-      </a:solidFill>
-    </cs:spPr>
-  </cs:dataPoint>
-  <cs:dataPoint3D>
-    <cs:lnRef idx="0"/>
-    <cs:fillRef idx="1">
-      <cs:styleClr val="auto"/>
-    </cs:fillRef>
-    <cs:effectRef idx="0"/>
-    <cs:fontRef idx="minor">
-      <a:schemeClr val="tx1"/>
-    </cs:fontRef>
-    <cs:spPr>
-      <a:solidFill>
-        <a:schemeClr val="phClr"/>
-      </a:solidFill>
-    </cs:spPr>
-  </cs:dataPoint3D>
-  <cs:dataPointLine>
-    <cs:lnRef idx="0">
-      <cs:styleClr val="auto"/>
-    </cs:lnRef>
-    <cs:fillRef idx="1"/>
-    <cs:effectRef idx="0"/>
-    <cs:fontRef idx="minor">
-      <a:schemeClr val="tx1"/>
-    </cs:fontRef>
-    <cs:spPr>
-      <a:ln w="28575" cap="rnd">
-        <a:solidFill>
-          <a:schemeClr val="phClr"/>
-        </a:solidFill>
-        <a:round/>
-      </a:ln>
-    </cs:spPr>
-  </cs:dataPointLine>
-  <cs:dataPointMarker>
-    <cs:lnRef idx="0">
-      <cs:styleClr val="auto"/>
-    </cs:lnRef>
-    <cs:fillRef idx="1">
-      <cs:styleClr val="auto"/>
-    </cs:fillRef>
-    <cs:effectRef idx="0"/>
-    <cs:fontRef idx="minor">
-      <a:schemeClr val="tx1"/>
-    </cs:fontRef>
-    <cs:spPr>
-      <a:solidFill>
-        <a:schemeClr val="phClr"/>
-      </a:solidFill>
-      <a:ln w="9525">
-        <a:solidFill>
-          <a:schemeClr val="phClr"/>
-        </a:solidFill>
-      </a:ln>
-    </cs:spPr>
-  </cs:dataPointMarker>
-  <cs:dataPointMarkerLayout symbol="circle" size="5"/>
-  <cs:dataPointWireframe>
-    <cs:lnRef idx="0">
-      <cs:styleClr val="auto"/>
-    </cs:lnRef>
-    <cs:fillRef idx="1"/>
-    <cs:effectRef idx="0"/>
-    <cs:fontRef idx="minor">
-      <a:schemeClr val="tx1"/>
-    </cs:fontRef>
-    <cs:spPr>
-      <a:ln w="9525" cap="rnd">
-        <a:solidFill>
-          <a:schemeClr val="phClr"/>
-        </a:solidFill>
-        <a:round/>
-      </a:ln>
-    </cs:spPr>
-  </cs:dataPointWireframe>
-  <cs:dataTable>
-    <cs:lnRef idx="0"/>
-    <cs:fillRef idx="0"/>
-    <cs:effectRef idx="0"/>
-    <cs:fontRef idx="minor">
-      <a:schemeClr val="tx1">
-        <a:lumMod val="65000"/>
-        <a:lumOff val="35000"/>
-      </a:schemeClr>
-    </cs:fontRef>
-    <cs:spPr>
-      <a:noFill/>
-      <a:ln w="9525" cap="flat" cmpd="sng" algn="ctr">
-        <a:solidFill>
-          <a:schemeClr val="tx1">
-            <a:lumMod val="15000"/>
-            <a:lumOff val="85000"/>
-          </a:schemeClr>
-        </a:solidFill>
-        <a:round/>
-      </a:ln>
-    </cs:spPr>
-    <cs:defRPr sz="900" kern="1200"/>
-  </cs:dataTable>
-  <cs:downBar>
-    <cs:lnRef idx="0"/>
-    <cs:fillRef idx="0"/>
-    <cs:effectRef idx="0"/>
-    <cs:fontRef idx="minor">
-      <a:schemeClr val="dk1"/>
-    </cs:fontRef>
-    <cs:spPr>
-      <a:solidFill>
-        <a:schemeClr val="dk1">
-          <a:lumMod val="65000"/>
-          <a:lumOff val="35000"/>
-        </a:schemeClr>
-      </a:solidFill>
-      <a:ln w="9525">
-        <a:solidFill>
-          <a:schemeClr val="tx1">
-            <a:lumMod val="65000"/>
-            <a:lumOff val="35000"/>
-          </a:schemeClr>
-        </a:solidFill>
-      </a:ln>
-    </cs:spPr>
-  </cs:downBar>
-  <cs:dropLine>
-    <cs:lnRef idx="0"/>
-    <cs:fillRef idx="0"/>
-    <cs:effectRef idx="0"/>
-    <cs:fontRef idx="minor">
-      <a:schemeClr val="tx1"/>
-    </cs:fontRef>
-    <cs:spPr>
-      <a:ln w="9525" cap="flat" cmpd="sng" algn="ctr">
-        <a:solidFill>
-          <a:schemeClr val="tx1">
-            <a:lumMod val="35000"/>
-            <a:lumOff val="65000"/>
-          </a:schemeClr>
-        </a:solidFill>
-        <a:round/>
-      </a:ln>
-    </cs:spPr>
-  </cs:dropLine>
-  <cs:errorBar>
-    <cs:lnRef idx="0"/>
-    <cs:fillRef idx="0"/>
-    <cs:effectRef idx="0"/>
-    <cs:fontRef idx="minor">
-      <a:schemeClr val="tx1"/>
-    </cs:fontRef>
-    <cs:spPr>
-      <a:ln w="9525" cap="flat" cmpd="sng" algn="ctr">
-        <a:solidFill>
-          <a:schemeClr val="tx1">
-            <a:lumMod val="65000"/>
-            <a:lumOff val="35000"/>
-          </a:schemeClr>
-        </a:solidFill>
-        <a:round/>
-      </a:ln>
-    </cs:spPr>
-  </cs:errorBar>
-  <cs:floor>
-    <cs:lnRef idx="0"/>
-    <cs:fillRef idx="0"/>
-    <cs:effectRef idx="0"/>
-    <cs:fontRef idx="minor">
-      <a:schemeClr val="tx1"/>
-    </cs:fontRef>
-    <cs:spPr>
-      <a:noFill/>
-      <a:ln>
-        <a:noFill/>
-      </a:ln>
-    </cs:spPr>
-  </cs:floor>
-  <cs:gridlineMajor>
-    <cs:lnRef idx="0"/>
-    <cs:fillRef idx="0"/>
-    <cs:effectRef idx="0"/>
-    <cs:fontRef idx="minor">
-      <a:schemeClr val="tx1"/>
-    </cs:fontRef>
-    <cs:spPr>
-      <a:ln w="9525" cap="flat" cmpd="sng" algn="ctr">
-        <a:solidFill>
-          <a:schemeClr val="tx1">
-            <a:lumMod val="15000"/>
-            <a:lumOff val="85000"/>
-          </a:schemeClr>
-        </a:solidFill>
-        <a:round/>
-      </a:ln>
-    </cs:spPr>
-  </cs:gridlineMajor>
-  <cs:gridlineMinor>
-    <cs:lnRef idx="0"/>
-    <cs:fillRef idx="0"/>
-    <cs:effectRef idx="0"/>
-    <cs:fontRef idx="minor">
-      <a:schemeClr val="tx1"/>
-    </cs:fontRef>
-    <cs:spPr>
-      <a:ln w="9525" cap="flat" cmpd="sng" algn="ctr">
-        <a:solidFill>
-          <a:schemeClr val="tx1">
-            <a:lumMod val="5000"/>
-            <a:lumOff val="95000"/>
-          </a:schemeClr>
-        </a:solidFill>
-        <a:round/>
-      </a:ln>
-    </cs:spPr>
-  </cs:gridlineMinor>
-  <cs:hiLoLine>
-    <cs:lnRef idx="0"/>
-    <cs:fillRef idx="0"/>
-    <cs:effectRef idx="0"/>
-    <cs:fontRef idx="minor">
-      <a:schemeClr val="tx1"/>
-    </cs:fontRef>
-    <cs:spPr>
-      <a:ln w="9525" cap="flat" cmpd="sng" algn="ctr">
-        <a:solidFill>
-          <a:schemeClr val="tx1">
-            <a:lumMod val="75000"/>
-            <a:lumOff val="25000"/>
-          </a:schemeClr>
-        </a:solidFill>
-        <a:round/>
-      </a:ln>
-    </cs:spPr>
-  </cs:hiLoLine>
-  <cs:leaderLine>
-    <cs:lnRef idx="0"/>
-    <cs:fillRef idx="0"/>
-    <cs:effectRef idx="0"/>
-    <cs:fontRef idx="minor">
-      <a:schemeClr val="tx1"/>
-    </cs:fontRef>
-    <cs:spPr>
-      <a:ln w="9525" cap="flat" cmpd="sng" algn="ctr">
-        <a:solidFill>
-          <a:schemeClr val="tx1">
-            <a:lumMod val="35000"/>
-            <a:lumOff val="65000"/>
-          </a:schemeClr>
-        </a:solidFill>
-        <a:round/>
-      </a:ln>
-    </cs:spPr>
-  </cs:leaderLine>
-  <cs:legend>
-    <cs:lnRef idx="0"/>
-    <cs:fillRef idx="0"/>
-    <cs:effectRef idx="0"/>
-    <cs:fontRef idx="minor">
-      <a:schemeClr val="tx1">
-        <a:lumMod val="65000"/>
-        <a:lumOff val="35000"/>
-      </a:schemeClr>
-    </cs:fontRef>
-    <cs:defRPr sz="900" kern="1200"/>
-  </cs:legend>
-  <cs:plotArea mods="allowNoFillOverride allowNoLineOverride">
-    <cs:lnRef idx="0"/>
-    <cs:fillRef idx="0"/>
-    <cs:effectRef idx="0"/>
-    <cs:fontRef idx="minor">
-      <a:schemeClr val="tx1"/>
-    </cs:fontRef>
-  </cs:plotArea>
-  <cs:plotArea3D mods="allowNoFillOverride allowNoLineOverride">
-    <cs:lnRef idx="0"/>
-    <cs:fillRef idx="0"/>
-    <cs:effectRef idx="0"/>
-    <cs:fontRef idx="minor">
-      <a:schemeClr val="tx1"/>
-    </cs:fontRef>
-  </cs:plotArea3D>
-  <cs:seriesAxis>
-    <cs:lnRef idx="0"/>
-    <cs:fillRef idx="0"/>
-    <cs:effectRef idx="0"/>
-    <cs:fontRef idx="minor">
-      <a:schemeClr val="tx1">
-        <a:lumMod val="65000"/>
-        <a:lumOff val="35000"/>
-      </a:schemeClr>
-    </cs:fontRef>
-    <cs:defRPr sz="900" kern="1200"/>
-  </cs:seriesAxis>
-  <cs:seriesLine>
-    <cs:lnRef idx="0"/>
-    <cs:fillRef idx="0"/>
-    <cs:effectRef idx="0"/>
-    <cs:fontRef idx="minor">
-      <a:schemeClr val="tx1"/>
-    </cs:fontRef>
-    <cs:spPr>
-      <a:ln w="9525" cap="flat" cmpd="sng" algn="ctr">
-        <a:solidFill>
-          <a:schemeClr val="tx1">
-            <a:lumMod val="35000"/>
-            <a:lumOff val="65000"/>
-          </a:schemeClr>
-        </a:solidFill>
-        <a:round/>
-      </a:ln>
-    </cs:spPr>
-  </cs:seriesLine>
-  <cs:title>
-    <cs:lnRef idx="0"/>
-    <cs:fillRef idx="0"/>
-    <cs:effectRef idx="0"/>
-    <cs:fontRef idx="minor">
-      <a:schemeClr val="tx1">
-        <a:lumMod val="65000"/>
-        <a:lumOff val="35000"/>
-      </a:schemeClr>
-    </cs:fontRef>
-    <cs:defRPr sz="1400" b="0" kern="1200" spc="0" baseline="0"/>
-  </cs:title>
-  <cs:trendline>
-    <cs:lnRef idx="0">
-      <cs:styleClr val="auto"/>
-    </cs:lnRef>
-    <cs:fillRef idx="0"/>
-    <cs:effectRef idx="0"/>
-    <cs:fontRef idx="minor">
-      <a:schemeClr val="tx1"/>
-    </cs:fontRef>
-    <cs:spPr>
-      <a:ln w="19050" cap="rnd">
-        <a:solidFill>
-          <a:schemeClr val="phClr"/>
-        </a:solidFill>
-        <a:prstDash val="sysDot"/>
-      </a:ln>
-    </cs:spPr>
-  </cs:trendline>
-  <cs:trendlineLabel>
-    <cs:lnRef idx="0"/>
-    <cs:fillRef idx="0"/>
-    <cs:effectRef idx="0"/>
-    <cs:fontRef idx="minor">
-      <a:schemeClr val="tx1">
-        <a:lumMod val="65000"/>
-        <a:lumOff val="35000"/>
-      </a:schemeClr>
-    </cs:fontRef>
-    <cs:defRPr sz="900" kern="1200"/>
-  </cs:trendlineLabel>
-  <cs:upBar>
-    <cs:lnRef idx="0"/>
-    <cs:fillRef idx="0"/>
-    <cs:effectRef idx="0"/>
-    <cs:fontRef idx="minor">
-      <a:schemeClr val="dk1"/>
-    </cs:fontRef>
-    <cs:spPr>
-      <a:solidFill>
-        <a:schemeClr val="lt1"/>
-      </a:solidFill>
-      <a:ln w="9525">
-        <a:solidFill>
-          <a:schemeClr val="tx1">
-            <a:lumMod val="15000"/>
-            <a:lumOff val="85000"/>
-          </a:schemeClr>
-        </a:solidFill>
-      </a:ln>
-    </cs:spPr>
-  </cs:upBar>
-  <cs:valueAxis>
-    <cs:lnRef idx="0"/>
-    <cs:fillRef idx="0"/>
-    <cs:effectRef idx="0"/>
-    <cs:fontRef idx="minor">
-      <a:schemeClr val="tx1">
-        <a:lumMod val="65000"/>
-        <a:lumOff val="35000"/>
-      </a:schemeClr>
-    </cs:fontRef>
-    <cs:defRPr sz="900" kern="1200"/>
-  </cs:valueAxis>
-  <cs:wall>
-    <cs:lnRef idx="0"/>
-    <cs:fillRef idx="0"/>
-    <cs:effectRef idx="0"/>
-    <cs:fontRef idx="minor">
-      <a:schemeClr val="tx1"/>
-    </cs:fontRef>
-    <cs:spPr>
-      <a:noFill/>
-      <a:ln>
-        <a:noFill/>
-      </a:ln>
-    </cs:spPr>
-  </cs:wall>
-</cs:chartStyle>
 </file>
 
 <file path=ppt/notesMasters/notesMaster1.xml><?xml version="1.0" encoding="utf-8"?>
@@ -1083,7 +556,7 @@
             <a:fld id="{C844735A-6EBE-4F02-86E9-F605F9C2786C}" type="datetimeFigureOut">
               <a:rPr lang="fr-FR" smtClean="0"/>
               <a:pPr/>
-              <a:t>13/04/2018</a:t>
+              <a:t>14/04/2018</a:t>
             </a:fld>
             <a:endParaRPr lang="fr-FR"/>
           </a:p>
@@ -1252,7 +725,7 @@
     </p:spTree>
     <p:extLst>
       <p:ext uri="{BB962C8B-B14F-4D97-AF65-F5344CB8AC3E}">
-        <p14:creationId xmlns:p14="http://schemas.microsoft.com/office/powerpoint/2010/main" xmlns="" val="2479878953"/>
+        <p14:creationId xmlns:p14="http://schemas.microsoft.com/office/powerpoint/2010/main" val="2479878953"/>
       </p:ext>
     </p:extLst>
   </p:cSld>
@@ -1496,7 +969,7 @@
     </p:spTree>
     <p:extLst>
       <p:ext uri="{BB962C8B-B14F-4D97-AF65-F5344CB8AC3E}">
-        <p14:creationId xmlns:p14="http://schemas.microsoft.com/office/powerpoint/2010/main" xmlns="" val="1597653524"/>
+        <p14:creationId xmlns:p14="http://schemas.microsoft.com/office/powerpoint/2010/main" val="1597653524"/>
       </p:ext>
     </p:extLst>
   </p:cSld>
@@ -1692,7 +1165,7 @@
     </p:spTree>
     <p:extLst>
       <p:ext uri="{BB962C8B-B14F-4D97-AF65-F5344CB8AC3E}">
-        <p14:creationId xmlns:p14="http://schemas.microsoft.com/office/powerpoint/2010/main" xmlns="" val="729632784"/>
+        <p14:creationId xmlns:p14="http://schemas.microsoft.com/office/powerpoint/2010/main" val="729632784"/>
       </p:ext>
     </p:extLst>
   </p:cSld>
@@ -1760,7 +1233,7 @@
     </p:spTree>
     <p:extLst>
       <p:ext uri="{BB962C8B-B14F-4D97-AF65-F5344CB8AC3E}">
-        <p14:creationId xmlns:p14="http://schemas.microsoft.com/office/powerpoint/2010/main" xmlns="" val="1056886810"/>
+        <p14:creationId xmlns:p14="http://schemas.microsoft.com/office/powerpoint/2010/main" val="1056886810"/>
       </p:ext>
     </p:extLst>
   </p:cSld>
@@ -1983,7 +1456,7 @@
     </p:spTree>
     <p:extLst>
       <p:ext uri="{BB962C8B-B14F-4D97-AF65-F5344CB8AC3E}">
-        <p14:creationId xmlns:p14="http://schemas.microsoft.com/office/powerpoint/2010/main" xmlns="" val="856040511"/>
+        <p14:creationId xmlns:p14="http://schemas.microsoft.com/office/powerpoint/2010/main" val="856040511"/>
       </p:ext>
     </p:extLst>
   </p:cSld>
@@ -2144,7 +1617,7 @@
     </p:spTree>
     <p:extLst>
       <p:ext uri="{BB962C8B-B14F-4D97-AF65-F5344CB8AC3E}">
-        <p14:creationId xmlns:p14="http://schemas.microsoft.com/office/powerpoint/2010/main" xmlns="" val="1491625700"/>
+        <p14:creationId xmlns:p14="http://schemas.microsoft.com/office/powerpoint/2010/main" val="1491625700"/>
       </p:ext>
     </p:extLst>
   </p:cSld>
@@ -2429,7 +1902,7 @@
     </p:spTree>
     <p:extLst>
       <p:ext uri="{BB962C8B-B14F-4D97-AF65-F5344CB8AC3E}">
-        <p14:creationId xmlns:p14="http://schemas.microsoft.com/office/powerpoint/2010/main" xmlns="" val="3368652214"/>
+        <p14:creationId xmlns:p14="http://schemas.microsoft.com/office/powerpoint/2010/main" val="3368652214"/>
       </p:ext>
     </p:extLst>
   </p:cSld>
@@ -3334,7 +2807,7 @@
     </p:spTree>
     <p:extLst>
       <p:ext uri="{BB962C8B-B14F-4D97-AF65-F5344CB8AC3E}">
-        <p14:creationId xmlns:p14="http://schemas.microsoft.com/office/powerpoint/2010/main" xmlns="" val="4143547553"/>
+        <p14:creationId xmlns:p14="http://schemas.microsoft.com/office/powerpoint/2010/main" val="4143547553"/>
       </p:ext>
     </p:extLst>
   </p:cSld>
@@ -3470,7 +2943,7 @@
     </p:spTree>
     <p:extLst>
       <p:ext uri="{BB962C8B-B14F-4D97-AF65-F5344CB8AC3E}">
-        <p14:creationId xmlns:p14="http://schemas.microsoft.com/office/powerpoint/2010/main" xmlns="" val="4027527166"/>
+        <p14:creationId xmlns:p14="http://schemas.microsoft.com/office/powerpoint/2010/main" val="4027527166"/>
       </p:ext>
     </p:extLst>
   </p:cSld>
@@ -3544,7 +3017,7 @@
     </p:spTree>
     <p:extLst>
       <p:ext uri="{BB962C8B-B14F-4D97-AF65-F5344CB8AC3E}">
-        <p14:creationId xmlns:p14="http://schemas.microsoft.com/office/powerpoint/2010/main" xmlns="" val="3304082058"/>
+        <p14:creationId xmlns:p14="http://schemas.microsoft.com/office/powerpoint/2010/main" val="3304082058"/>
       </p:ext>
     </p:extLst>
   </p:cSld>
@@ -3660,7 +3133,7 @@
     </p:spTree>
     <p:extLst>
       <p:ext uri="{BB962C8B-B14F-4D97-AF65-F5344CB8AC3E}">
-        <p14:creationId xmlns:p14="http://schemas.microsoft.com/office/powerpoint/2010/main" xmlns="" val="3081517712"/>
+        <p14:creationId xmlns:p14="http://schemas.microsoft.com/office/powerpoint/2010/main" val="3081517712"/>
       </p:ext>
     </p:extLst>
   </p:cSld>
@@ -3868,7 +3341,7 @@
     </p:spTree>
     <p:extLst>
       <p:ext uri="{BB962C8B-B14F-4D97-AF65-F5344CB8AC3E}">
-        <p14:creationId xmlns:p14="http://schemas.microsoft.com/office/powerpoint/2010/main" xmlns="" val="3142083048"/>
+        <p14:creationId xmlns:p14="http://schemas.microsoft.com/office/powerpoint/2010/main" val="3142083048"/>
       </p:ext>
     </p:extLst>
   </p:cSld>
@@ -5554,7 +5027,7 @@
             <a:blip r:embed="rId7">
               <a:extLst>
                 <a:ext uri="{28A0092B-C50C-407E-A947-70E740481C1C}">
-                  <a14:useLocalDpi xmlns:a14="http://schemas.microsoft.com/office/drawing/2010/main" xmlns="" val="0"/>
+                  <a14:useLocalDpi xmlns:a14="http://schemas.microsoft.com/office/drawing/2010/main" val="0"/>
                 </a:ext>
               </a:extLst>
             </a:blip>
@@ -5572,7 +5045,7 @@
             <a:noFill/>
             <a:extLst>
               <a:ext uri="{909E8E84-426E-40dd-AFC4-6F175D3DCCD1}">
-                <a14:hiddenFill xmlns:a14="http://schemas.microsoft.com/office/drawing/2010/main" xmlns="">
+                <a14:hiddenFill xmlns="" xmlns:a14="http://schemas.microsoft.com/office/drawing/2010/main">
                   <a:solidFill>
                     <a:srgbClr val="FFFFFF"/>
                   </a:solidFill>
@@ -5593,7 +5066,7 @@
             <a:blip r:embed="rId8" cstate="print">
               <a:extLst>
                 <a:ext uri="{28A0092B-C50C-407E-A947-70E740481C1C}">
-                  <a14:useLocalDpi xmlns:a14="http://schemas.microsoft.com/office/drawing/2010/main" xmlns="" val="0"/>
+                  <a14:useLocalDpi xmlns:a14="http://schemas.microsoft.com/office/drawing/2010/main" val="0"/>
                 </a:ext>
               </a:extLst>
             </a:blip>
@@ -5613,7 +5086,7 @@
             <a:noFill/>
             <a:extLst>
               <a:ext uri="{909E8E84-426E-40dd-AFC4-6F175D3DCCD1}">
-                <a14:hiddenFill xmlns:a14="http://schemas.microsoft.com/office/drawing/2010/main" xmlns="">
+                <a14:hiddenFill xmlns="" xmlns:a14="http://schemas.microsoft.com/office/drawing/2010/main">
                   <a:solidFill>
                     <a:srgbClr val="FFFFFF"/>
                   </a:solidFill>
@@ -5684,7 +5157,7 @@
             <a:blip r:embed="rId9" cstate="print">
               <a:extLst>
                 <a:ext uri="{28A0092B-C50C-407E-A947-70E740481C1C}">
-                  <a14:useLocalDpi xmlns:a14="http://schemas.microsoft.com/office/drawing/2010/main" xmlns="" val="0"/>
+                  <a14:useLocalDpi xmlns:a14="http://schemas.microsoft.com/office/drawing/2010/main" val="0"/>
                 </a:ext>
               </a:extLst>
             </a:blip>
@@ -5702,7 +5175,7 @@
             <a:noFill/>
             <a:extLst>
               <a:ext uri="{909E8E84-426E-40dd-AFC4-6F175D3DCCD1}">
-                <a14:hiddenFill xmlns:a14="http://schemas.microsoft.com/office/drawing/2010/main" xmlns="">
+                <a14:hiddenFill xmlns="" xmlns:a14="http://schemas.microsoft.com/office/drawing/2010/main">
                   <a:solidFill>
                     <a:srgbClr val="FFFFFF"/>
                   </a:solidFill>
@@ -5763,7 +5236,7 @@
     </p:spTree>
     <p:extLst>
       <p:ext uri="{BB962C8B-B14F-4D97-AF65-F5344CB8AC3E}">
-        <p14:creationId xmlns:p14="http://schemas.microsoft.com/office/powerpoint/2010/main" xmlns="" val="547571833"/>
+        <p14:creationId xmlns:p14="http://schemas.microsoft.com/office/powerpoint/2010/main" val="547571833"/>
       </p:ext>
     </p:extLst>
   </p:cSld>
@@ -7664,7 +7137,7 @@
     </p:spTree>
     <p:extLst>
       <p:ext uri="{BB962C8B-B14F-4D97-AF65-F5344CB8AC3E}">
-        <p14:creationId xmlns:p14="http://schemas.microsoft.com/office/powerpoint/2010/main" xmlns="" val="2357226408"/>
+        <p14:creationId xmlns:p14="http://schemas.microsoft.com/office/powerpoint/2010/main" val="2357226408"/>
       </p:ext>
     </p:extLst>
   </p:cSld>
@@ -8013,7 +7486,7 @@
             <a:blip r:embed="rId6">
               <a:extLst>
                 <a:ext uri="{28A0092B-C50C-407E-A947-70E740481C1C}">
-                  <a14:useLocalDpi xmlns:a14="http://schemas.microsoft.com/office/drawing/2010/main" xmlns="" val="0"/>
+                  <a14:useLocalDpi xmlns:a14="http://schemas.microsoft.com/office/drawing/2010/main" val="0"/>
                 </a:ext>
               </a:extLst>
             </a:blip>
@@ -8031,7 +7504,7 @@
             <a:noFill/>
             <a:extLst>
               <a:ext uri="{909E8E84-426E-40dd-AFC4-6F175D3DCCD1}">
-                <a14:hiddenFill xmlns:a14="http://schemas.microsoft.com/office/drawing/2010/main" xmlns="">
+                <a14:hiddenFill xmlns="" xmlns:a14="http://schemas.microsoft.com/office/drawing/2010/main">
                   <a:solidFill>
                     <a:srgbClr val="FFFFFF"/>
                   </a:solidFill>
@@ -8052,7 +7525,7 @@
             <a:blip r:embed="rId7" cstate="print">
               <a:extLst>
                 <a:ext uri="{28A0092B-C50C-407E-A947-70E740481C1C}">
-                  <a14:useLocalDpi xmlns:a14="http://schemas.microsoft.com/office/drawing/2010/main" xmlns="" val="0"/>
+                  <a14:useLocalDpi xmlns:a14="http://schemas.microsoft.com/office/drawing/2010/main" val="0"/>
                 </a:ext>
               </a:extLst>
             </a:blip>
@@ -8072,7 +7545,7 @@
             <a:noFill/>
             <a:extLst>
               <a:ext uri="{909E8E84-426E-40dd-AFC4-6F175D3DCCD1}">
-                <a14:hiddenFill xmlns:a14="http://schemas.microsoft.com/office/drawing/2010/main" xmlns="">
+                <a14:hiddenFill xmlns="" xmlns:a14="http://schemas.microsoft.com/office/drawing/2010/main">
                   <a:solidFill>
                     <a:srgbClr val="FFFFFF"/>
                   </a:solidFill>
@@ -8143,7 +7616,7 @@
             <a:blip r:embed="rId8" cstate="print">
               <a:extLst>
                 <a:ext uri="{28A0092B-C50C-407E-A947-70E740481C1C}">
-                  <a14:useLocalDpi xmlns:a14="http://schemas.microsoft.com/office/drawing/2010/main" xmlns="" val="0"/>
+                  <a14:useLocalDpi xmlns:a14="http://schemas.microsoft.com/office/drawing/2010/main" val="0"/>
                 </a:ext>
               </a:extLst>
             </a:blip>
@@ -8161,7 +7634,7 @@
             <a:noFill/>
             <a:extLst>
               <a:ext uri="{909E8E84-426E-40dd-AFC4-6F175D3DCCD1}">
-                <a14:hiddenFill xmlns:a14="http://schemas.microsoft.com/office/drawing/2010/main" xmlns="">
+                <a14:hiddenFill xmlns="" xmlns:a14="http://schemas.microsoft.com/office/drawing/2010/main">
                   <a:solidFill>
                     <a:srgbClr val="FFFFFF"/>
                   </a:solidFill>
@@ -9023,7 +8496,7 @@
     </p:spTree>
     <p:extLst>
       <p:ext uri="{BB962C8B-B14F-4D97-AF65-F5344CB8AC3E}">
-        <p14:creationId xmlns:p14="http://schemas.microsoft.com/office/powerpoint/2010/main" xmlns="" val="168395928"/>
+        <p14:creationId xmlns:p14="http://schemas.microsoft.com/office/powerpoint/2010/main" val="168395928"/>
       </p:ext>
     </p:extLst>
   </p:cSld>
@@ -9421,7 +8894,7 @@
     </p:spTree>
     <p:extLst>
       <p:ext uri="{BB962C8B-B14F-4D97-AF65-F5344CB8AC3E}">
-        <p14:creationId xmlns:p14="http://schemas.microsoft.com/office/powerpoint/2010/main" xmlns="" val="3707583858"/>
+        <p14:creationId xmlns:p14="http://schemas.microsoft.com/office/powerpoint/2010/main" val="3707583858"/>
       </p:ext>
     </p:extLst>
   </p:cSld>
@@ -9797,7 +9270,7 @@
     </p:spTree>
     <p:extLst>
       <p:ext uri="{BB962C8B-B14F-4D97-AF65-F5344CB8AC3E}">
-        <p14:creationId xmlns:p14="http://schemas.microsoft.com/office/powerpoint/2010/main" xmlns="" val="98231638"/>
+        <p14:creationId xmlns:p14="http://schemas.microsoft.com/office/powerpoint/2010/main" val="98231638"/>
       </p:ext>
     </p:extLst>
   </p:cSld>
@@ -9942,7 +9415,7 @@
     </p:spTree>
     <p:extLst>
       <p:ext uri="{BB962C8B-B14F-4D97-AF65-F5344CB8AC3E}">
-        <p14:creationId xmlns:p14="http://schemas.microsoft.com/office/powerpoint/2010/main" xmlns="" val="3773551245"/>
+        <p14:creationId xmlns:p14="http://schemas.microsoft.com/office/powerpoint/2010/main" val="3773551245"/>
       </p:ext>
     </p:extLst>
   </p:cSld>
@@ -10091,11 +9564,7 @@
             </a:r>
             <a:r>
               <a:rPr lang="en-US" dirty="0" smtClean="0"/>
-              <a:t> </a:t>
-            </a:r>
-            <a:r>
-              <a:rPr lang="en-US" dirty="0" smtClean="0"/>
-              <a:t>(2-3 slides)</a:t>
+              <a:t> (2-3 slides)</a:t>
             </a:r>
             <a:endParaRPr lang="en-US" dirty="0"/>
           </a:p>
@@ -10104,7 +9573,7 @@
     </p:spTree>
     <p:extLst>
       <p:ext uri="{BB962C8B-B14F-4D97-AF65-F5344CB8AC3E}">
-        <p14:creationId xmlns:p14="http://schemas.microsoft.com/office/powerpoint/2010/main" xmlns="" val="565318803"/>
+        <p14:creationId xmlns:p14="http://schemas.microsoft.com/office/powerpoint/2010/main" val="565318803"/>
       </p:ext>
     </p:extLst>
   </p:cSld>
@@ -10224,7 +9693,6 @@
               <a:rPr lang="fr-FR" dirty="0" smtClean="0"/>
               <a:t>En retour de cette méthode, on obtient une liste qui contient toutes les différentes meilleures solutions pour chaque ville, il ne nous reste ensuite plus qu’à récupérer la meilleure d’entre elle.</a:t>
             </a:r>
-            <a:endParaRPr lang="fr-FR" dirty="0" smtClean="0"/>
           </a:p>
         </p:txBody>
       </p:sp>
@@ -10258,7 +9726,7 @@
     </p:spTree>
     <p:extLst>
       <p:ext uri="{BB962C8B-B14F-4D97-AF65-F5344CB8AC3E}">
-        <p14:creationId xmlns:p14="http://schemas.microsoft.com/office/powerpoint/2010/main" xmlns="" val="2014737294"/>
+        <p14:creationId xmlns:p14="http://schemas.microsoft.com/office/powerpoint/2010/main" val="2014737294"/>
       </p:ext>
     </p:extLst>
   </p:cSld>
@@ -10358,7 +9826,7 @@
     </p:spTree>
     <p:extLst>
       <p:ext uri="{BB962C8B-B14F-4D97-AF65-F5344CB8AC3E}">
-        <p14:creationId xmlns:p14="http://schemas.microsoft.com/office/powerpoint/2010/main" xmlns="" val="493409273"/>
+        <p14:creationId xmlns:p14="http://schemas.microsoft.com/office/powerpoint/2010/main" val="493409273"/>
       </p:ext>
     </p:extLst>
   </p:cSld>
@@ -10408,8 +9876,8 @@
           <a:lstStyle/>
           <a:p>
             <a:r>
-              <a:rPr lang="en-US" dirty="0" smtClean="0"/>
-              <a:t>Results (2 slides)</a:t>
+              <a:rPr lang="en-US" dirty="0" err="1" smtClean="0"/>
+              <a:t>Résultats</a:t>
             </a:r>
             <a:endParaRPr lang="en-US" dirty="0"/>
           </a:p>
@@ -10424,14 +9892,14 @@
           <p:nvPr>
             <p:extLst>
               <p:ext uri="{D42A27DB-BD31-4B8C-83A1-F6EECF244321}">
-                <p14:modId xmlns:p14="http://schemas.microsoft.com/office/powerpoint/2010/main" xmlns="" val="1785705513"/>
+                <p14:modId xmlns:p14="http://schemas.microsoft.com/office/powerpoint/2010/main" val="2166556259"/>
               </p:ext>
             </p:extLst>
           </p:nvPr>
         </p:nvGraphicFramePr>
         <p:xfrm>
-          <a:off x="2893662" y="1202405"/>
-          <a:ext cx="6174296" cy="2494280"/>
+          <a:off x="6399273" y="1398007"/>
+          <a:ext cx="5355191" cy="3977640"/>
         </p:xfrm>
         <a:graphic>
           <a:graphicData uri="http://schemas.openxmlformats.org/drawingml/2006/table">
@@ -10440,24 +9908,24 @@
                 <a:tableStyleId>{5C22544A-7EE6-4342-B048-85BDC9FD1C3A}</a:tableStyleId>
               </a:tblPr>
               <a:tblGrid>
-                <a:gridCol w="2032000">
+                <a:gridCol w="1075835">
                   <a:extLst>
                     <a:ext uri="{9D8B030D-6E8A-4147-A177-3AD203B41FA5}">
-                      <a16:colId xmlns:a16="http://schemas.microsoft.com/office/drawing/2014/main" xmlns="" val="20000"/>
+                      <a16:colId xmlns:a16="http://schemas.microsoft.com/office/drawing/2014/main" val="20000"/>
                     </a:ext>
                   </a:extLst>
                 </a:gridCol>
-                <a:gridCol w="2032000">
+                <a:gridCol w="1560601">
                   <a:extLst>
                     <a:ext uri="{9D8B030D-6E8A-4147-A177-3AD203B41FA5}">
-                      <a16:colId xmlns:a16="http://schemas.microsoft.com/office/drawing/2014/main" xmlns="" val="20001"/>
+                      <a16:colId xmlns:a16="http://schemas.microsoft.com/office/drawing/2014/main" val="20001"/>
                     </a:ext>
                   </a:extLst>
                 </a:gridCol>
-                <a:gridCol w="2110296">
+                <a:gridCol w="2718755">
                   <a:extLst>
                     <a:ext uri="{9D8B030D-6E8A-4147-A177-3AD203B41FA5}">
-                      <a16:colId xmlns:a16="http://schemas.microsoft.com/office/drawing/2014/main" xmlns="" val="20002"/>
+                      <a16:colId xmlns:a16="http://schemas.microsoft.com/office/drawing/2014/main" val="20002"/>
                     </a:ext>
                   </a:extLst>
                 </a:gridCol>
@@ -10473,24 +9941,20 @@
                         <a:rPr lang="en-US" dirty="0" smtClean="0"/>
                         <a:t>Instance</a:t>
                       </a:r>
-                      <a:endParaRPr lang="en-US" dirty="0"/>
                     </a:p>
-                  </a:txBody>
-                  <a:tcPr/>
-                </a:tc>
-                <a:tc>
-                  <a:txBody>
-                    <a:bodyPr/>
-                    <a:lstStyle/>
                     <a:p>
                       <a:pPr algn="ctr"/>
                       <a:r>
                         <a:rPr lang="en-US" dirty="0" smtClean="0"/>
-                        <a:t>Time</a:t>
+                        <a:t>(</a:t>
                       </a:r>
                       <a:r>
-                        <a:rPr lang="en-US" baseline="0" dirty="0" smtClean="0"/>
-                        <a:t> limit (s)</a:t>
+                        <a:rPr lang="en-US" dirty="0" err="1" smtClean="0"/>
+                        <a:t>fichier</a:t>
+                      </a:r>
+                      <a:r>
+                        <a:rPr lang="en-US" dirty="0" smtClean="0"/>
+                        <a:t>)</a:t>
                       </a:r>
                       <a:endParaRPr lang="en-US" dirty="0"/>
                     </a:p>
@@ -10504,33 +9968,36 @@
                     <a:p>
                       <a:pPr algn="ctr"/>
                       <a:r>
+                        <a:rPr lang="en-US" dirty="0" err="1" smtClean="0"/>
+                        <a:t>Durée</a:t>
+                      </a:r>
+                      <a:r>
                         <a:rPr lang="en-US" dirty="0" smtClean="0"/>
-                        <a:t>Avg. optimality</a:t>
+                        <a:t> max</a:t>
+                      </a:r>
+                      <a:endParaRPr lang="en-US" baseline="0" dirty="0" smtClean="0"/>
+                    </a:p>
+                    <a:p>
+                      <a:pPr algn="ctr"/>
+                      <a:r>
+                        <a:rPr lang="en-US" baseline="0" dirty="0" smtClean="0"/>
+                        <a:t>(</a:t>
+                      </a:r>
+                      <a:r>
+                        <a:rPr lang="en-US" baseline="0" dirty="0" err="1" smtClean="0"/>
+                        <a:t>en</a:t>
                       </a:r>
                       <a:r>
                         <a:rPr lang="en-US" baseline="0" dirty="0" smtClean="0"/>
-                        <a:t> gap*</a:t>
+                        <a:t> </a:t>
                       </a:r>
-                      <a:endParaRPr lang="en-US" dirty="0"/>
-                    </a:p>
-                  </a:txBody>
-                  <a:tcPr/>
-                </a:tc>
-                <a:extLst>
-                  <a:ext uri="{0D108BD9-81ED-4DB2-BD59-A6C34878D82A}">
-                    <a16:rowId xmlns:a16="http://schemas.microsoft.com/office/drawing/2014/main" xmlns="" val="10000"/>
-                  </a:ext>
-                </a:extLst>
-              </a:tr>
-              <a:tr h="370840">
-                <a:tc>
-                  <a:txBody>
-                    <a:bodyPr/>
-                    <a:lstStyle/>
-                    <a:p>
                       <a:r>
-                        <a:rPr lang="en-US" dirty="0" smtClean="0"/>
-                        <a:t>wi29</a:t>
+                        <a:rPr lang="en-US" baseline="0" dirty="0" err="1" smtClean="0"/>
+                        <a:t>secondes</a:t>
+                      </a:r>
+                      <a:r>
+                        <a:rPr lang="en-US" baseline="0" dirty="0" smtClean="0"/>
+                        <a:t>)</a:t>
                       </a:r>
                       <a:endParaRPr lang="en-US" dirty="0"/>
                     </a:p>
@@ -10542,11 +10009,61 @@
                     <a:bodyPr/>
                     <a:lstStyle/>
                     <a:p>
+                      <a:pPr algn="ctr"/>
+                      <a:r>
+                        <a:rPr lang="en-US" dirty="0" err="1" smtClean="0"/>
+                        <a:t>Ecart</a:t>
+                      </a:r>
                       <a:r>
                         <a:rPr lang="en-US" dirty="0" smtClean="0"/>
-                        <a:t>10</a:t>
+                        <a:t> </a:t>
+                      </a:r>
+                      <a:r>
+                        <a:rPr lang="en-US" dirty="0" err="1" smtClean="0"/>
+                        <a:t>moyen</a:t>
+                      </a:r>
+                      <a:r>
+                        <a:rPr lang="en-US" baseline="0" dirty="0" smtClean="0"/>
+                        <a:t> optimum</a:t>
+                      </a:r>
+                    </a:p>
+                    <a:p>
+                      <a:pPr algn="ctr"/>
+                      <a:r>
+                        <a:rPr lang="en-US" baseline="0" dirty="0" smtClean="0"/>
+                        <a:t>(</a:t>
+                      </a:r>
+                      <a:r>
+                        <a:rPr lang="en-US" baseline="0" dirty="0" err="1" smtClean="0"/>
+                        <a:t>en</a:t>
+                      </a:r>
+                      <a:r>
+                        <a:rPr lang="en-US" baseline="0" dirty="0" smtClean="0"/>
+                        <a:t> %)</a:t>
                       </a:r>
                       <a:endParaRPr lang="en-US" dirty="0"/>
+                    </a:p>
+                  </a:txBody>
+                  <a:tcPr/>
+                </a:tc>
+                <a:extLst>
+                  <a:ext uri="{0D108BD9-81ED-4DB2-BD59-A6C34878D82A}">
+                    <a16:rowId xmlns:a16="http://schemas.microsoft.com/office/drawing/2014/main" val="10000"/>
+                  </a:ext>
+                </a:extLst>
+              </a:tr>
+              <a:tr h="370840">
+                <a:tc>
+                  <a:txBody>
+                    <a:bodyPr/>
+                    <a:lstStyle/>
+                    <a:p>
+                      <a:pPr algn="ctr"/>
+                      <a:r>
+                        <a:rPr lang="en-US" sz="1600" dirty="0" smtClean="0"/>
+                        <a:t>wi29</a:t>
+                      </a:r>
+                      <a:endParaRPr lang="en-US" sz="1600" dirty="0"/>
                     </a:p>
                   </a:txBody>
                   <a:tcPr/>
@@ -10556,18 +10073,34 @@
                     <a:bodyPr/>
                     <a:lstStyle/>
                     <a:p>
+                      <a:pPr algn="ctr"/>
                       <a:r>
-                        <a:rPr lang="en-US" dirty="0" smtClean="0"/>
-                        <a:t>X</a:t>
+                        <a:rPr lang="en-US" sz="1600" dirty="0" smtClean="0"/>
+                        <a:t>10</a:t>
                       </a:r>
-                      <a:endParaRPr lang="en-US" dirty="0"/>
+                      <a:endParaRPr lang="en-US" sz="1600" dirty="0"/>
+                    </a:p>
+                  </a:txBody>
+                  <a:tcPr/>
+                </a:tc>
+                <a:tc>
+                  <a:txBody>
+                    <a:bodyPr/>
+                    <a:lstStyle/>
+                    <a:p>
+                      <a:pPr algn="ctr"/>
+                      <a:r>
+                        <a:rPr lang="en-US" sz="1600" dirty="0" smtClean="0"/>
+                        <a:t>1.59</a:t>
+                      </a:r>
+                      <a:endParaRPr lang="en-US" sz="1600" dirty="0"/>
                     </a:p>
                   </a:txBody>
                   <a:tcPr/>
                 </a:tc>
                 <a:extLst>
                   <a:ext uri="{0D108BD9-81ED-4DB2-BD59-A6C34878D82A}">
-                    <a16:rowId xmlns:a16="http://schemas.microsoft.com/office/drawing/2014/main" xmlns="" val="10001"/>
+                    <a16:rowId xmlns:a16="http://schemas.microsoft.com/office/drawing/2014/main" val="874662559"/>
                   </a:ext>
                 </a:extLst>
               </a:tr>
@@ -10577,11 +10110,12 @@
                     <a:bodyPr/>
                     <a:lstStyle/>
                     <a:p>
+                      <a:pPr algn="ctr"/>
                       <a:r>
-                        <a:rPr lang="en-US" dirty="0" smtClean="0"/>
+                        <a:rPr lang="en-US" sz="1600" dirty="0" smtClean="0"/>
                         <a:t>wi29</a:t>
                       </a:r>
-                      <a:endParaRPr lang="en-US" dirty="0"/>
+                      <a:endParaRPr lang="en-US" sz="1600" dirty="0"/>
                     </a:p>
                   </a:txBody>
                   <a:tcPr/>
@@ -10591,11 +10125,12 @@
                     <a:bodyPr/>
                     <a:lstStyle/>
                     <a:p>
+                      <a:pPr algn="ctr"/>
                       <a:r>
-                        <a:rPr lang="en-US" dirty="0" smtClean="0"/>
+                        <a:rPr lang="en-US" sz="1600" dirty="0" smtClean="0"/>
                         <a:t>20</a:t>
                       </a:r>
-                      <a:endParaRPr lang="en-US" dirty="0"/>
+                      <a:endParaRPr lang="en-US" sz="1600" dirty="0"/>
                     </a:p>
                   </a:txBody>
                   <a:tcPr/>
@@ -10605,18 +10140,19 @@
                     <a:bodyPr/>
                     <a:lstStyle/>
                     <a:p>
+                      <a:pPr algn="ctr"/>
                       <a:r>
-                        <a:rPr lang="en-US" dirty="0" smtClean="0"/>
-                        <a:t>Y</a:t>
+                        <a:rPr lang="en-US" sz="1600" dirty="0" smtClean="0"/>
+                        <a:t>1.49</a:t>
                       </a:r>
-                      <a:endParaRPr lang="en-US" dirty="0"/>
+                      <a:endParaRPr lang="en-US" sz="1600" dirty="0"/>
                     </a:p>
                   </a:txBody>
                   <a:tcPr/>
                 </a:tc>
                 <a:extLst>
                   <a:ext uri="{0D108BD9-81ED-4DB2-BD59-A6C34878D82A}">
-                    <a16:rowId xmlns:a16="http://schemas.microsoft.com/office/drawing/2014/main" xmlns="" val="10002"/>
+                    <a16:rowId xmlns:a16="http://schemas.microsoft.com/office/drawing/2014/main" val="10001"/>
                   </a:ext>
                 </a:extLst>
               </a:tr>
@@ -10626,11 +10162,12 @@
                     <a:bodyPr/>
                     <a:lstStyle/>
                     <a:p>
+                      <a:pPr algn="ctr"/>
                       <a:r>
-                        <a:rPr lang="en-US" dirty="0" smtClean="0"/>
+                        <a:rPr lang="en-US" sz="1600" dirty="0" smtClean="0"/>
                         <a:t>wi29</a:t>
                       </a:r>
-                      <a:endParaRPr lang="en-US" dirty="0"/>
+                      <a:endParaRPr lang="en-US" sz="1600" dirty="0"/>
                     </a:p>
                   </a:txBody>
                   <a:tcPr/>
@@ -10640,11 +10177,12 @@
                     <a:bodyPr/>
                     <a:lstStyle/>
                     <a:p>
+                      <a:pPr algn="ctr"/>
                       <a:r>
-                        <a:rPr lang="en-US" dirty="0" smtClean="0"/>
+                        <a:rPr lang="en-US" sz="1600" dirty="0" smtClean="0"/>
                         <a:t>40</a:t>
                       </a:r>
-                      <a:endParaRPr lang="en-US" dirty="0"/>
+                      <a:endParaRPr lang="en-US" sz="1600" dirty="0"/>
                     </a:p>
                   </a:txBody>
                   <a:tcPr/>
@@ -10654,18 +10192,19 @@
                     <a:bodyPr/>
                     <a:lstStyle/>
                     <a:p>
+                      <a:pPr algn="ctr"/>
                       <a:r>
-                        <a:rPr lang="en-US" dirty="0" smtClean="0"/>
-                        <a:t>Z</a:t>
+                        <a:rPr lang="en-US" sz="1600" dirty="0" smtClean="0"/>
+                        <a:t>1.41</a:t>
                       </a:r>
-                      <a:endParaRPr lang="en-US" dirty="0"/>
+                      <a:endParaRPr lang="en-US" sz="1600" dirty="0"/>
                     </a:p>
                   </a:txBody>
                   <a:tcPr/>
                 </a:tc>
                 <a:extLst>
                   <a:ext uri="{0D108BD9-81ED-4DB2-BD59-A6C34878D82A}">
-                    <a16:rowId xmlns:a16="http://schemas.microsoft.com/office/drawing/2014/main" xmlns="" val="10003"/>
+                    <a16:rowId xmlns:a16="http://schemas.microsoft.com/office/drawing/2014/main" val="1361785963"/>
                   </a:ext>
                 </a:extLst>
               </a:tr>
@@ -10675,11 +10214,12 @@
                     <a:bodyPr/>
                     <a:lstStyle/>
                     <a:p>
+                      <a:pPr algn="ctr"/>
                       <a:r>
-                        <a:rPr lang="it-IT" dirty="0" smtClean="0"/>
+                        <a:rPr lang="en-US" sz="1600" dirty="0" smtClean="0"/>
                         <a:t>qa194</a:t>
                       </a:r>
-                      <a:endParaRPr lang="en-US" dirty="0"/>
+                      <a:endParaRPr lang="en-US" sz="1600" dirty="0"/>
                     </a:p>
                   </a:txBody>
                   <a:tcPr/>
@@ -10689,11 +10229,12 @@
                     <a:bodyPr/>
                     <a:lstStyle/>
                     <a:p>
+                      <a:pPr algn="ctr"/>
                       <a:r>
-                        <a:rPr lang="en-US" dirty="0" smtClean="0"/>
+                        <a:rPr lang="en-US" sz="1600" dirty="0" smtClean="0"/>
                         <a:t>10</a:t>
                       </a:r>
-                      <a:endParaRPr lang="en-US" dirty="0"/>
+                      <a:endParaRPr lang="en-US" sz="1600" dirty="0"/>
                     </a:p>
                   </a:txBody>
                   <a:tcPr/>
@@ -10703,18 +10244,19 @@
                     <a:bodyPr/>
                     <a:lstStyle/>
                     <a:p>
+                      <a:pPr algn="ctr"/>
                       <a:r>
-                        <a:rPr lang="en-US" dirty="0" smtClean="0"/>
-                        <a:t>X’</a:t>
+                        <a:rPr lang="en-US" sz="1600" dirty="0" smtClean="0"/>
+                        <a:t>7.59</a:t>
                       </a:r>
-                      <a:endParaRPr lang="en-US" dirty="0"/>
+                      <a:endParaRPr lang="en-US" sz="1600" dirty="0"/>
                     </a:p>
                   </a:txBody>
                   <a:tcPr/>
                 </a:tc>
                 <a:extLst>
                   <a:ext uri="{0D108BD9-81ED-4DB2-BD59-A6C34878D82A}">
-                    <a16:rowId xmlns:a16="http://schemas.microsoft.com/office/drawing/2014/main" xmlns="" val="10004"/>
+                    <a16:rowId xmlns:a16="http://schemas.microsoft.com/office/drawing/2014/main" val="10002"/>
                   </a:ext>
                 </a:extLst>
               </a:tr>
@@ -10724,11 +10266,27 @@
                     <a:bodyPr/>
                     <a:lstStyle/>
                     <a:p>
+                      <a:pPr marL="0" marR="0" lvl="0" indent="0" algn="ctr" defTabSz="914400" rtl="0" eaLnBrk="1" fontAlgn="auto" latinLnBrk="0" hangingPunct="1">
+                        <a:lnSpc>
+                          <a:spcPct val="100000"/>
+                        </a:lnSpc>
+                        <a:spcBef>
+                          <a:spcPts val="0"/>
+                        </a:spcBef>
+                        <a:spcAft>
+                          <a:spcPts val="0"/>
+                        </a:spcAft>
+                        <a:buClrTx/>
+                        <a:buSzTx/>
+                        <a:buFontTx/>
+                        <a:buNone/>
+                        <a:tabLst/>
+                        <a:defRPr/>
+                      </a:pPr>
                       <a:r>
-                        <a:rPr lang="is-IS" dirty="0" smtClean="0"/>
-                        <a:t>…</a:t>
+                        <a:rPr lang="en-US" sz="1600" dirty="0" smtClean="0"/>
+                        <a:t>qa194</a:t>
                       </a:r>
-                      <a:endParaRPr lang="en-US" dirty="0"/>
                     </a:p>
                   </a:txBody>
                   <a:tcPr/>
@@ -10738,11 +10296,12 @@
                     <a:bodyPr/>
                     <a:lstStyle/>
                     <a:p>
+                      <a:pPr algn="ctr"/>
                       <a:r>
-                        <a:rPr lang="is-IS" dirty="0" smtClean="0"/>
-                        <a:t>…</a:t>
+                        <a:rPr lang="en-US" sz="1600" dirty="0" smtClean="0"/>
+                        <a:t>20</a:t>
                       </a:r>
-                      <a:endParaRPr lang="en-US" dirty="0"/>
+                      <a:endParaRPr lang="en-US" sz="1600" dirty="0"/>
                     </a:p>
                   </a:txBody>
                   <a:tcPr/>
@@ -10752,18 +10311,272 @@
                     <a:bodyPr/>
                     <a:lstStyle/>
                     <a:p>
+                      <a:pPr algn="ctr"/>
                       <a:r>
-                        <a:rPr lang="is-IS" dirty="0" smtClean="0"/>
-                        <a:t>…</a:t>
+                        <a:rPr lang="en-US" sz="1600" dirty="0" smtClean="0"/>
+                        <a:t>7.34</a:t>
                       </a:r>
-                      <a:endParaRPr lang="en-US" dirty="0"/>
+                      <a:endParaRPr lang="en-US" sz="1600" dirty="0"/>
                     </a:p>
                   </a:txBody>
                   <a:tcPr/>
                 </a:tc>
                 <a:extLst>
                   <a:ext uri="{0D108BD9-81ED-4DB2-BD59-A6C34878D82A}">
-                    <a16:rowId xmlns:a16="http://schemas.microsoft.com/office/drawing/2014/main" xmlns="" val="10005"/>
+                    <a16:rowId xmlns:a16="http://schemas.microsoft.com/office/drawing/2014/main" val="10003"/>
+                  </a:ext>
+                </a:extLst>
+              </a:tr>
+              <a:tr h="370840">
+                <a:tc>
+                  <a:txBody>
+                    <a:bodyPr/>
+                    <a:lstStyle/>
+                    <a:p>
+                      <a:pPr marL="0" marR="0" lvl="0" indent="0" algn="ctr" defTabSz="914400" rtl="0" eaLnBrk="1" fontAlgn="auto" latinLnBrk="0" hangingPunct="1">
+                        <a:lnSpc>
+                          <a:spcPct val="100000"/>
+                        </a:lnSpc>
+                        <a:spcBef>
+                          <a:spcPts val="0"/>
+                        </a:spcBef>
+                        <a:spcAft>
+                          <a:spcPts val="0"/>
+                        </a:spcAft>
+                        <a:buClrTx/>
+                        <a:buSzTx/>
+                        <a:buFontTx/>
+                        <a:buNone/>
+                        <a:tabLst/>
+                        <a:defRPr/>
+                      </a:pPr>
+                      <a:r>
+                        <a:rPr lang="en-US" sz="1600" dirty="0" smtClean="0"/>
+                        <a:t>qa194</a:t>
+                      </a:r>
+                    </a:p>
+                  </a:txBody>
+                  <a:tcPr/>
+                </a:tc>
+                <a:tc>
+                  <a:txBody>
+                    <a:bodyPr/>
+                    <a:lstStyle/>
+                    <a:p>
+                      <a:pPr algn="ctr"/>
+                      <a:r>
+                        <a:rPr lang="en-US" sz="1600" dirty="0" smtClean="0"/>
+                        <a:t>40</a:t>
+                      </a:r>
+                      <a:endParaRPr lang="en-US" sz="1600" dirty="0"/>
+                    </a:p>
+                  </a:txBody>
+                  <a:tcPr/>
+                </a:tc>
+                <a:tc>
+                  <a:txBody>
+                    <a:bodyPr/>
+                    <a:lstStyle/>
+                    <a:p>
+                      <a:pPr algn="ctr"/>
+                      <a:r>
+                        <a:rPr lang="en-US" sz="1600" dirty="0" smtClean="0"/>
+                        <a:t>7.33</a:t>
+                      </a:r>
+                      <a:endParaRPr lang="en-US" sz="1600" dirty="0"/>
+                    </a:p>
+                  </a:txBody>
+                  <a:tcPr/>
+                </a:tc>
+                <a:extLst>
+                  <a:ext uri="{0D108BD9-81ED-4DB2-BD59-A6C34878D82A}">
+                    <a16:rowId xmlns:a16="http://schemas.microsoft.com/office/drawing/2014/main" val="1527334627"/>
+                  </a:ext>
+                </a:extLst>
+              </a:tr>
+              <a:tr h="370840">
+                <a:tc>
+                  <a:txBody>
+                    <a:bodyPr/>
+                    <a:lstStyle/>
+                    <a:p>
+                      <a:pPr algn="ctr"/>
+                      <a:r>
+                        <a:rPr lang="en-US" sz="1600" dirty="0" smtClean="0"/>
+                        <a:t>uy734</a:t>
+                      </a:r>
+                      <a:endParaRPr lang="en-US" sz="1600" dirty="0"/>
+                    </a:p>
+                  </a:txBody>
+                  <a:tcPr/>
+                </a:tc>
+                <a:tc>
+                  <a:txBody>
+                    <a:bodyPr/>
+                    <a:lstStyle/>
+                    <a:p>
+                      <a:pPr algn="ctr"/>
+                      <a:r>
+                        <a:rPr lang="en-US" sz="1600" dirty="0" smtClean="0"/>
+                        <a:t>10</a:t>
+                      </a:r>
+                      <a:endParaRPr lang="en-US" sz="1600" dirty="0"/>
+                    </a:p>
+                  </a:txBody>
+                  <a:tcPr/>
+                </a:tc>
+                <a:tc>
+                  <a:txBody>
+                    <a:bodyPr/>
+                    <a:lstStyle/>
+                    <a:p>
+                      <a:pPr algn="ctr"/>
+                      <a:r>
+                        <a:rPr lang="en-US" sz="1600" dirty="0" smtClean="0"/>
+                        <a:t>18.98</a:t>
+                      </a:r>
+                      <a:endParaRPr lang="en-US" sz="1600" dirty="0"/>
+                    </a:p>
+                  </a:txBody>
+                  <a:tcPr/>
+                </a:tc>
+                <a:extLst>
+                  <a:ext uri="{0D108BD9-81ED-4DB2-BD59-A6C34878D82A}">
+                    <a16:rowId xmlns:a16="http://schemas.microsoft.com/office/drawing/2014/main" val="3792653972"/>
+                  </a:ext>
+                </a:extLst>
+              </a:tr>
+              <a:tr h="370840">
+                <a:tc>
+                  <a:txBody>
+                    <a:bodyPr/>
+                    <a:lstStyle/>
+                    <a:p>
+                      <a:pPr marL="0" marR="0" lvl="0" indent="0" algn="ctr" defTabSz="914400" rtl="0" eaLnBrk="1" fontAlgn="auto" latinLnBrk="0" hangingPunct="1">
+                        <a:lnSpc>
+                          <a:spcPct val="100000"/>
+                        </a:lnSpc>
+                        <a:spcBef>
+                          <a:spcPts val="0"/>
+                        </a:spcBef>
+                        <a:spcAft>
+                          <a:spcPts val="0"/>
+                        </a:spcAft>
+                        <a:buClrTx/>
+                        <a:buSzTx/>
+                        <a:buFontTx/>
+                        <a:buNone/>
+                        <a:tabLst/>
+                        <a:defRPr/>
+                      </a:pPr>
+                      <a:r>
+                        <a:rPr lang="en-US" sz="1600" dirty="0" smtClean="0"/>
+                        <a:t>uy734</a:t>
+                      </a:r>
+                    </a:p>
+                  </a:txBody>
+                  <a:tcPr/>
+                </a:tc>
+                <a:tc>
+                  <a:txBody>
+                    <a:bodyPr/>
+                    <a:lstStyle/>
+                    <a:p>
+                      <a:pPr algn="ctr"/>
+                      <a:r>
+                        <a:rPr lang="en-US" sz="1600" dirty="0" smtClean="0"/>
+                        <a:t>20</a:t>
+                      </a:r>
+                      <a:endParaRPr lang="en-US" sz="1600" dirty="0"/>
+                    </a:p>
+                  </a:txBody>
+                  <a:tcPr/>
+                </a:tc>
+                <a:tc>
+                  <a:txBody>
+                    <a:bodyPr/>
+                    <a:lstStyle/>
+                    <a:p>
+                      <a:pPr algn="ctr"/>
+                      <a:r>
+                        <a:rPr lang="en-US" sz="1600" dirty="0" smtClean="0"/>
+                        <a:t>18.73</a:t>
+                      </a:r>
+                      <a:endParaRPr lang="en-US" sz="1600" dirty="0"/>
+                    </a:p>
+                  </a:txBody>
+                  <a:tcPr/>
+                </a:tc>
+                <a:extLst>
+                  <a:ext uri="{0D108BD9-81ED-4DB2-BD59-A6C34878D82A}">
+                    <a16:rowId xmlns:a16="http://schemas.microsoft.com/office/drawing/2014/main" val="2943019833"/>
+                  </a:ext>
+                </a:extLst>
+              </a:tr>
+              <a:tr h="370840">
+                <a:tc>
+                  <a:txBody>
+                    <a:bodyPr/>
+                    <a:lstStyle/>
+                    <a:p>
+                      <a:pPr marL="0" marR="0" lvl="0" indent="0" algn="ctr" defTabSz="914400" rtl="0" eaLnBrk="1" fontAlgn="auto" latinLnBrk="0" hangingPunct="1">
+                        <a:lnSpc>
+                          <a:spcPct val="100000"/>
+                        </a:lnSpc>
+                        <a:spcBef>
+                          <a:spcPts val="0"/>
+                        </a:spcBef>
+                        <a:spcAft>
+                          <a:spcPts val="0"/>
+                        </a:spcAft>
+                        <a:buClrTx/>
+                        <a:buSzTx/>
+                        <a:buFontTx/>
+                        <a:buNone/>
+                        <a:tabLst/>
+                        <a:defRPr/>
+                      </a:pPr>
+                      <a:r>
+                        <a:rPr lang="en-US" sz="1600" dirty="0" smtClean="0"/>
+                        <a:t>uy734</a:t>
+                      </a:r>
+                    </a:p>
+                  </a:txBody>
+                  <a:tcPr/>
+                </a:tc>
+                <a:tc>
+                  <a:txBody>
+                    <a:bodyPr/>
+                    <a:lstStyle/>
+                    <a:p>
+                      <a:pPr algn="ctr"/>
+                      <a:r>
+                        <a:rPr lang="en-US" sz="1600" dirty="0" smtClean="0"/>
+                        <a:t>40</a:t>
+                      </a:r>
+                      <a:endParaRPr lang="en-US" sz="1600" dirty="0"/>
+                    </a:p>
+                  </a:txBody>
+                  <a:tcPr/>
+                </a:tc>
+                <a:tc>
+                  <a:txBody>
+                    <a:bodyPr/>
+                    <a:lstStyle/>
+                    <a:p>
+                      <a:pPr algn="ctr"/>
+                      <a:r>
+                        <a:rPr lang="en-US" sz="1600" dirty="0" smtClean="0"/>
+                        <a:t>18.60</a:t>
+                      </a:r>
+                      <a:endParaRPr lang="en-US" sz="1600" dirty="0"/>
+                    </a:p>
+                  </a:txBody>
+                  <a:tcPr/>
+                </a:tc>
+                <a:extLst>
+                  <a:ext uri="{0D108BD9-81ED-4DB2-BD59-A6C34878D82A}">
+                    <a16:rowId xmlns:a16="http://schemas.microsoft.com/office/drawing/2014/main" val="3543114398"/>
                   </a:ext>
                 </a:extLst>
               </a:tr>
@@ -10772,7 +10585,7 @@
         </a:graphic>
       </p:graphicFrame>
       <mc:AlternateContent xmlns:mc="http://schemas.openxmlformats.org/markup-compatibility/2006">
-        <mc:Choice xmlns:a14="http://schemas.microsoft.com/office/drawing/2010/main" xmlns="" Requires="a14">
+        <mc:Choice xmlns:a14="http://schemas.microsoft.com/office/drawing/2010/main" Requires="a14">
           <p:sp>
             <p:nvSpPr>
               <p:cNvPr id="7" name="TextBox 6"/>
@@ -10781,8 +10594,8 @@
             </p:nvSpPr>
             <p:spPr>
               <a:xfrm>
-                <a:off x="6998683" y="4684091"/>
-                <a:ext cx="5029197" cy="586122"/>
+                <a:off x="362710" y="5082298"/>
+                <a:ext cx="5482911" cy="586699"/>
               </a:xfrm>
               <a:prstGeom prst="rect">
                 <a:avLst/>
@@ -10803,10 +10616,16 @@
                     </m:oMathParaPr>
                     <m:oMath xmlns:m="http://schemas.openxmlformats.org/officeDocument/2006/math">
                       <m:r>
-                        <a:rPr lang="es-ES" b="0" i="1" smtClean="0">
-                          <a:latin typeface="Cambria Math" charset="0"/>
+                        <a:rPr lang="fr-FR" b="0" i="1" smtClean="0">
+                          <a:latin typeface="Cambria Math" panose="02040503050406030204" pitchFamily="18" charset="0"/>
                         </a:rPr>
-                        <m:t>𝑔𝑎𝑝</m:t>
+                        <m:t>é</m:t>
+                      </m:r>
+                      <m:r>
+                        <a:rPr lang="fr-FR" b="0" i="1" smtClean="0">
+                          <a:latin typeface="Cambria Math" panose="02040503050406030204" pitchFamily="18" charset="0"/>
+                        </a:rPr>
+                        <m:t>𝑐𝑎𝑟𝑡</m:t>
                       </m:r>
                       <m:r>
                         <a:rPr lang="es-ES" b="0" i="1" smtClean="0">
@@ -10839,22 +10658,28 @@
                             </m:dPr>
                             <m:e>
                               <m:r>
-                                <a:rPr lang="es-ES" i="1">
-                                  <a:latin typeface="Cambria Math" charset="0"/>
+                                <a:rPr lang="fr-FR" i="1" smtClean="0">
+                                  <a:latin typeface="Cambria Math" panose="02040503050406030204" pitchFamily="18" charset="0"/>
                                 </a:rPr>
-                                <m:t>𝑦𝑜𝑢𝑟</m:t>
+                                <m:t>𝑛</m:t>
                               </m:r>
                               <m:r>
-                                <a:rPr lang="es-ES" i="1">
-                                  <a:latin typeface="Cambria Math" charset="0"/>
+                                <a:rPr lang="fr-FR" b="0" i="1" smtClean="0">
+                                  <a:latin typeface="Cambria Math" panose="02040503050406030204" pitchFamily="18" charset="0"/>
+                                </a:rPr>
+                                <m:t>𝑜𝑡𝑟𝑒</m:t>
+                              </m:r>
+                              <m:r>
+                                <a:rPr lang="fr-FR" b="0" i="1" smtClean="0">
+                                  <a:latin typeface="Cambria Math" panose="02040503050406030204" pitchFamily="18" charset="0"/>
                                 </a:rPr>
                                 <m:t> </m:t>
                               </m:r>
                               <m:r>
-                                <a:rPr lang="es-ES" i="1">
-                                  <a:latin typeface="Cambria Math" charset="0"/>
+                                <a:rPr lang="fr-FR" b="0" i="1" smtClean="0">
+                                  <a:latin typeface="Cambria Math" panose="02040503050406030204" pitchFamily="18" charset="0"/>
                                 </a:rPr>
-                                <m:t>𝑎𝑙𝑔𝑜𝑟𝑖𝑡h𝑚</m:t>
+                                <m:t>𝑎𝑙𝑔𝑜𝑟𝑖𝑡h𝑚𝑒</m:t>
                               </m:r>
                             </m:e>
                           </m:d>
@@ -10880,11 +10705,11 @@
                             <a:rPr lang="es-ES" i="1">
                               <a:latin typeface="Cambria Math" charset="0"/>
                             </a:rPr>
-                            <m:t>𝑜𝑝𝑡𝑖𝑚𝑎𝑙</m:t>
+                            <m:t>𝑠𝑜𝑙𝑢𝑡𝑖𝑜𝑛</m:t>
                           </m:r>
                           <m:r>
-                            <a:rPr lang="es-ES" i="1">
-                              <a:latin typeface="Cambria Math" charset="0"/>
+                            <a:rPr lang="fr-FR" b="0" i="1" smtClean="0">
+                              <a:latin typeface="Cambria Math" panose="02040503050406030204" pitchFamily="18" charset="0"/>
                             </a:rPr>
                             <m:t> </m:t>
                           </m:r>
@@ -10892,7 +10717,13 @@
                             <a:rPr lang="es-ES" i="1">
                               <a:latin typeface="Cambria Math" charset="0"/>
                             </a:rPr>
-                            <m:t>𝑠𝑜𝑙𝑢𝑡𝑖𝑜𝑛</m:t>
+                            <m:t>𝑜𝑝𝑡𝑖𝑚𝑎𝑙</m:t>
+                          </m:r>
+                          <m:r>
+                            <a:rPr lang="fr-FR" b="0" i="1" smtClean="0">
+                              <a:latin typeface="Cambria Math" panose="02040503050406030204" pitchFamily="18" charset="0"/>
+                            </a:rPr>
+                            <m:t>𝑒</m:t>
                           </m:r>
                           <m:r>
                             <a:rPr lang="es-ES" i="1">
@@ -10915,22 +10746,28 @@
                             <m:t>(</m:t>
                           </m:r>
                           <m:r>
-                            <a:rPr lang="es-ES" b="0" i="1" smtClean="0">
+                            <a:rPr lang="es-ES" i="1">
+                              <a:latin typeface="Cambria Math" charset="0"/>
+                            </a:rPr>
+                            <m:t>𝑠𝑜𝑙𝑢𝑡𝑖𝑜𝑛</m:t>
+                          </m:r>
+                          <m:r>
+                            <a:rPr lang="fr-FR" i="1">
+                              <a:latin typeface="Cambria Math" panose="02040503050406030204" pitchFamily="18" charset="0"/>
+                            </a:rPr>
+                            <m:t> </m:t>
+                          </m:r>
+                          <m:r>
+                            <a:rPr lang="es-ES" i="1">
                               <a:latin typeface="Cambria Math" charset="0"/>
                             </a:rPr>
                             <m:t>𝑜𝑝𝑡𝑖𝑚𝑎𝑙</m:t>
                           </m:r>
                           <m:r>
-                            <a:rPr lang="es-ES" b="0" i="1" smtClean="0">
-                              <a:latin typeface="Cambria Math" charset="0"/>
+                            <a:rPr lang="fr-FR" i="1">
+                              <a:latin typeface="Cambria Math" panose="02040503050406030204" pitchFamily="18" charset="0"/>
                             </a:rPr>
-                            <m:t> </m:t>
-                          </m:r>
-                          <m:r>
-                            <a:rPr lang="es-ES" b="0" i="1" smtClean="0">
-                              <a:latin typeface="Cambria Math" charset="0"/>
-                            </a:rPr>
-                            <m:t>𝑠𝑜𝑙𝑢𝑡𝑖𝑜𝑛</m:t>
+                            <m:t>𝑒</m:t>
                           </m:r>
                           <m:r>
                             <a:rPr lang="es-ES" b="0" i="1" smtClean="0">
@@ -10959,13 +10796,13 @@
             </p:nvSpPr>
             <p:spPr>
               <a:xfrm>
-                <a:off x="6998683" y="4684091"/>
-                <a:ext cx="5029197" cy="586122"/>
+                <a:off x="362710" y="5082298"/>
+                <a:ext cx="5482911" cy="586699"/>
               </a:xfrm>
               <a:prstGeom prst="rect">
                 <a:avLst/>
               </a:prstGeom>
-              <a:blipFill rotWithShape="0">
+              <a:blipFill>
                 <a:blip r:embed="rId2"/>
                 <a:stretch>
                   <a:fillRect/>
@@ -10977,7 +10814,7 @@
               <a:lstStyle/>
               <a:p>
                 <a:r>
-                  <a:rPr lang="en-US">
+                  <a:rPr lang="fr-FR">
                     <a:noFill/>
                   </a:rPr>
                   <a:t> </a:t>
@@ -10995,8 +10832,8 @@
         </p:nvSpPr>
         <p:spPr>
           <a:xfrm>
-            <a:off x="292664" y="3822990"/>
-            <a:ext cx="6706019" cy="2308324"/>
+            <a:off x="117248" y="1398007"/>
+            <a:ext cx="5973836" cy="2862322"/>
           </a:xfrm>
           <a:prstGeom prst="rect">
             <a:avLst/>
@@ -11009,42 +10846,370 @@
           </a:bodyPr>
           <a:lstStyle/>
           <a:p>
-            <a:pPr marL="285750" indent="-285750">
+            <a:pPr marL="285750" indent="-285750" algn="just">
               <a:buFont typeface="Arial" charset="0"/>
               <a:buChar char="•"/>
             </a:pPr>
             <a:r>
               <a:rPr lang="en-US" dirty="0" smtClean="0"/>
-              <a:t>Fix a set of parameters (e.g., a number of threads and a number of tasks) – Explain in a line how you fixed the parameters</a:t>
+              <a:t>Après divers tests, nous </a:t>
+            </a:r>
+            <a:r>
+              <a:rPr lang="en-US" dirty="0" err="1" smtClean="0"/>
+              <a:t>avons</a:t>
+            </a:r>
+            <a:r>
+              <a:rPr lang="en-US" dirty="0" smtClean="0"/>
+              <a:t> </a:t>
+            </a:r>
+            <a:r>
+              <a:rPr lang="en-US" dirty="0" err="1" smtClean="0"/>
+              <a:t>décidé</a:t>
+            </a:r>
+            <a:r>
+              <a:rPr lang="en-US" dirty="0" smtClean="0"/>
+              <a:t> de </a:t>
+            </a:r>
+            <a:r>
+              <a:rPr lang="en-US" dirty="0" err="1" smtClean="0"/>
+              <a:t>réaliser</a:t>
+            </a:r>
+            <a:r>
+              <a:rPr lang="en-US" dirty="0" smtClean="0"/>
+              <a:t> </a:t>
+            </a:r>
+            <a:r>
+              <a:rPr lang="en-US" dirty="0" err="1" smtClean="0"/>
+              <a:t>tous</a:t>
+            </a:r>
+            <a:r>
+              <a:rPr lang="en-US" dirty="0" smtClean="0"/>
+              <a:t> </a:t>
+            </a:r>
+            <a:r>
+              <a:rPr lang="en-US" dirty="0" err="1" smtClean="0"/>
+              <a:t>nos</a:t>
+            </a:r>
+            <a:r>
+              <a:rPr lang="en-US" dirty="0" smtClean="0"/>
+              <a:t> tests avec 24 </a:t>
+            </a:r>
+            <a:r>
+              <a:rPr lang="en-US" dirty="0" err="1" smtClean="0"/>
+              <a:t>tâches</a:t>
+            </a:r>
+            <a:r>
+              <a:rPr lang="en-US" dirty="0" smtClean="0"/>
+              <a:t> </a:t>
+            </a:r>
+            <a:r>
+              <a:rPr lang="en-US" dirty="0" err="1" smtClean="0"/>
+              <a:t>réparties</a:t>
+            </a:r>
+            <a:r>
+              <a:rPr lang="en-US" dirty="0" smtClean="0"/>
+              <a:t> sur 6 threads. Nous </a:t>
+            </a:r>
+            <a:r>
+              <a:rPr lang="en-US" dirty="0" err="1" smtClean="0"/>
+              <a:t>avons</a:t>
+            </a:r>
+            <a:r>
+              <a:rPr lang="en-US" dirty="0" smtClean="0"/>
+              <a:t> </a:t>
+            </a:r>
+            <a:r>
+              <a:rPr lang="en-US" dirty="0" err="1" smtClean="0"/>
+              <a:t>fixé</a:t>
+            </a:r>
+            <a:r>
+              <a:rPr lang="en-US" dirty="0" smtClean="0"/>
+              <a:t> le </a:t>
+            </a:r>
+            <a:r>
+              <a:rPr lang="en-US" dirty="0" err="1" smtClean="0"/>
+              <a:t>nombre</a:t>
+            </a:r>
+            <a:r>
+              <a:rPr lang="en-US" dirty="0" smtClean="0"/>
+              <a:t> de thread à 6 car </a:t>
+            </a:r>
+            <a:r>
+              <a:rPr lang="en-US" dirty="0" err="1" smtClean="0"/>
+              <a:t>nos</a:t>
+            </a:r>
+            <a:r>
+              <a:rPr lang="en-US" dirty="0" smtClean="0"/>
+              <a:t> PC </a:t>
+            </a:r>
+            <a:r>
+              <a:rPr lang="en-US" dirty="0" err="1" smtClean="0"/>
+              <a:t>disposaient</a:t>
+            </a:r>
+            <a:r>
+              <a:rPr lang="en-US" dirty="0" smtClean="0"/>
+              <a:t> de 4 </a:t>
+            </a:r>
+            <a:r>
+              <a:rPr lang="en-US" dirty="0" err="1" smtClean="0"/>
+              <a:t>coeurs</a:t>
+            </a:r>
+            <a:r>
+              <a:rPr lang="en-US" dirty="0" smtClean="0"/>
+              <a:t>, or </a:t>
+            </a:r>
+            <a:r>
+              <a:rPr lang="en-US" dirty="0" err="1" smtClean="0"/>
+              <a:t>lors</a:t>
+            </a:r>
+            <a:r>
+              <a:rPr lang="en-US" dirty="0" smtClean="0"/>
+              <a:t> de </a:t>
+            </a:r>
+            <a:r>
+              <a:rPr lang="en-US" dirty="0" err="1" smtClean="0"/>
+              <a:t>notre</a:t>
+            </a:r>
+            <a:r>
+              <a:rPr lang="en-US" dirty="0" smtClean="0"/>
+              <a:t> CM </a:t>
+            </a:r>
+            <a:r>
+              <a:rPr lang="en-US" dirty="0" err="1" smtClean="0"/>
+              <a:t>d’ASR</a:t>
+            </a:r>
+            <a:r>
+              <a:rPr lang="en-US" dirty="0" smtClean="0"/>
+              <a:t> multi-thread, </a:t>
+            </a:r>
+            <a:r>
+              <a:rPr lang="en-US" dirty="0" err="1" smtClean="0"/>
+              <a:t>il</a:t>
+            </a:r>
+            <a:r>
+              <a:rPr lang="en-US" dirty="0" smtClean="0"/>
+              <a:t> nous a </a:t>
+            </a:r>
+            <a:r>
+              <a:rPr lang="en-US" dirty="0" err="1" smtClean="0"/>
+              <a:t>été</a:t>
+            </a:r>
+            <a:r>
+              <a:rPr lang="en-US" dirty="0" smtClean="0"/>
+              <a:t> </a:t>
+            </a:r>
+            <a:r>
+              <a:rPr lang="en-US" dirty="0" err="1" smtClean="0"/>
+              <a:t>dit</a:t>
+            </a:r>
+            <a:r>
+              <a:rPr lang="en-US" dirty="0" smtClean="0"/>
+              <a:t>  </a:t>
+            </a:r>
+            <a:r>
+              <a:rPr lang="en-US" dirty="0" err="1" smtClean="0"/>
+              <a:t>qu’il</a:t>
+            </a:r>
+            <a:r>
+              <a:rPr lang="en-US" dirty="0" smtClean="0"/>
+              <a:t> </a:t>
+            </a:r>
+            <a:r>
+              <a:rPr lang="en-US" dirty="0" err="1" smtClean="0"/>
+              <a:t>fallait</a:t>
+            </a:r>
+            <a:r>
+              <a:rPr lang="en-US" dirty="0" smtClean="0"/>
+              <a:t> </a:t>
+            </a:r>
+            <a:r>
+              <a:rPr lang="en-US" dirty="0" err="1" smtClean="0"/>
+              <a:t>toujours</a:t>
+            </a:r>
+            <a:r>
+              <a:rPr lang="en-US" dirty="0" smtClean="0"/>
+              <a:t> </a:t>
+            </a:r>
+            <a:r>
+              <a:rPr lang="en-US" dirty="0" err="1" smtClean="0"/>
+              <a:t>avoir</a:t>
+            </a:r>
+            <a:r>
+              <a:rPr lang="en-US" dirty="0" smtClean="0"/>
+              <a:t> plus de threads que de </a:t>
+            </a:r>
+            <a:r>
+              <a:rPr lang="en-US" dirty="0" err="1" smtClean="0"/>
+              <a:t>coeurs</a:t>
+            </a:r>
+            <a:r>
+              <a:rPr lang="en-US" dirty="0" smtClean="0"/>
+              <a:t>.</a:t>
             </a:r>
           </a:p>
           <a:p>
-            <a:pPr marL="285750" indent="-285750">
+            <a:pPr marL="285750" indent="-285750" algn="just">
               <a:buFont typeface="Arial" charset="0"/>
               <a:buChar char="•"/>
             </a:pPr>
             <a:r>
               <a:rPr lang="en-US" dirty="0" smtClean="0"/>
-              <a:t>Run your algorithm, with the fixed parameters, 10 times (with different seeds) for different execution times (e.g., 10, 20, and 40 s)</a:t>
+              <a:t>Les </a:t>
+            </a:r>
+            <a:r>
+              <a:rPr lang="en-US" dirty="0" err="1" smtClean="0"/>
+              <a:t>différents</a:t>
+            </a:r>
+            <a:r>
+              <a:rPr lang="en-US" dirty="0" smtClean="0"/>
+              <a:t> </a:t>
+            </a:r>
+            <a:r>
+              <a:rPr lang="en-US" dirty="0" err="1" smtClean="0"/>
+              <a:t>résultats</a:t>
+            </a:r>
+            <a:r>
+              <a:rPr lang="en-US" dirty="0" smtClean="0"/>
+              <a:t> que nous </a:t>
+            </a:r>
+            <a:r>
+              <a:rPr lang="en-US" dirty="0" err="1" smtClean="0"/>
+              <a:t>avons</a:t>
+            </a:r>
+            <a:r>
+              <a:rPr lang="en-US" dirty="0" smtClean="0"/>
+              <a:t> </a:t>
+            </a:r>
+            <a:r>
+              <a:rPr lang="en-US" dirty="0" err="1" smtClean="0"/>
+              <a:t>ensuite</a:t>
+            </a:r>
+            <a:r>
+              <a:rPr lang="en-US" dirty="0" smtClean="0"/>
+              <a:t> </a:t>
+            </a:r>
+            <a:r>
+              <a:rPr lang="en-US" dirty="0" err="1" smtClean="0"/>
+              <a:t>obtenus</a:t>
+            </a:r>
+            <a:r>
+              <a:rPr lang="en-US" dirty="0" smtClean="0"/>
+              <a:t> </a:t>
+            </a:r>
+            <a:r>
+              <a:rPr lang="en-US" dirty="0" err="1" smtClean="0"/>
+              <a:t>sont</a:t>
+            </a:r>
+            <a:r>
+              <a:rPr lang="en-US" dirty="0" smtClean="0"/>
+              <a:t> </a:t>
+            </a:r>
+            <a:r>
+              <a:rPr lang="en-US" dirty="0" err="1" smtClean="0"/>
+              <a:t>tous</a:t>
+            </a:r>
+            <a:r>
+              <a:rPr lang="en-US" dirty="0" smtClean="0"/>
+              <a:t> </a:t>
+            </a:r>
+            <a:r>
+              <a:rPr lang="en-US" dirty="0" err="1" smtClean="0"/>
+              <a:t>indiqués</a:t>
+            </a:r>
+            <a:r>
+              <a:rPr lang="en-US" dirty="0" smtClean="0"/>
+              <a:t> </a:t>
+            </a:r>
+            <a:r>
+              <a:rPr lang="en-US" dirty="0" err="1" smtClean="0"/>
+              <a:t>dans</a:t>
+            </a:r>
+            <a:r>
+              <a:rPr lang="en-US" dirty="0" smtClean="0"/>
+              <a:t> le tableau ci-</a:t>
+            </a:r>
+            <a:r>
+              <a:rPr lang="en-US" dirty="0" err="1" smtClean="0"/>
+              <a:t>contre</a:t>
+            </a:r>
+            <a:r>
+              <a:rPr lang="en-US" dirty="0" smtClean="0"/>
+              <a:t>.</a:t>
             </a:r>
           </a:p>
           <a:p>
-            <a:pPr marL="285750" indent="-285750">
+            <a:pPr marL="285750" indent="-285750" algn="just">
               <a:buFont typeface="Arial" charset="0"/>
               <a:buChar char="•"/>
             </a:pPr>
             <a:r>
               <a:rPr lang="en-US" dirty="0" smtClean="0"/>
-              <a:t>For each run compute the gap between the objective function of your solution, and the optimal solution (see the expression on the right) and report the average (over the 10 runs on the table)</a:t>
-            </a:r>
-            <a:endParaRPr lang="en-US" dirty="0"/>
+              <a:t>Le </a:t>
+            </a:r>
+            <a:r>
+              <a:rPr lang="en-US" dirty="0" err="1" smtClean="0"/>
+              <a:t>calcul</a:t>
+            </a:r>
+            <a:r>
+              <a:rPr lang="en-US" dirty="0" smtClean="0"/>
+              <a:t> de </a:t>
+            </a:r>
+            <a:r>
+              <a:rPr lang="en-US" dirty="0" err="1" smtClean="0"/>
+              <a:t>l’écart</a:t>
+            </a:r>
+            <a:r>
+              <a:rPr lang="en-US" dirty="0" smtClean="0"/>
+              <a:t> </a:t>
+            </a:r>
+            <a:r>
+              <a:rPr lang="en-US" dirty="0" err="1" smtClean="0"/>
+              <a:t>moyen</a:t>
+            </a:r>
+            <a:r>
+              <a:rPr lang="en-US" dirty="0" smtClean="0"/>
+              <a:t> </a:t>
+            </a:r>
+            <a:r>
+              <a:rPr lang="en-US" dirty="0" err="1" smtClean="0"/>
+              <a:t>est</a:t>
+            </a:r>
+            <a:r>
+              <a:rPr lang="en-US" dirty="0" smtClean="0"/>
+              <a:t> fait à </a:t>
+            </a:r>
+            <a:r>
+              <a:rPr lang="en-US" dirty="0" err="1" smtClean="0"/>
+              <a:t>l’aide</a:t>
+            </a:r>
+            <a:r>
+              <a:rPr lang="en-US" dirty="0" smtClean="0"/>
+              <a:t> de la </a:t>
+            </a:r>
+            <a:r>
+              <a:rPr lang="en-US" dirty="0" err="1" smtClean="0"/>
+              <a:t>formule</a:t>
+            </a:r>
+            <a:r>
+              <a:rPr lang="en-US" dirty="0" smtClean="0"/>
+              <a:t> ci-</a:t>
+            </a:r>
+            <a:r>
+              <a:rPr lang="en-US" dirty="0" err="1" smtClean="0"/>
+              <a:t>dessous</a:t>
+            </a:r>
+            <a:r>
+              <a:rPr lang="en-US" dirty="0" smtClean="0"/>
+              <a:t>.</a:t>
+            </a:r>
+            <a:endParaRPr lang="en-US" dirty="0" smtClean="0"/>
           </a:p>
         </p:txBody>
       </p:sp>
     </p:spTree>
     <p:extLst>
       <p:ext uri="{BB962C8B-B14F-4D97-AF65-F5344CB8AC3E}">
-        <p14:creationId xmlns:p14="http://schemas.microsoft.com/office/powerpoint/2010/main" xmlns="" val="2033306419"/>
+        <p14:creationId xmlns:p14="http://schemas.microsoft.com/office/powerpoint/2010/main" val="2033306419"/>
       </p:ext>
     </p:extLst>
   </p:cSld>
@@ -11094,13 +11259,654 @@
           <a:lstStyle/>
           <a:p>
             <a:r>
-              <a:rPr lang="en-US" dirty="0" smtClean="0"/>
-              <a:t>Results (2 slides)</a:t>
+              <a:rPr lang="en-US" dirty="0" err="1" smtClean="0"/>
+              <a:t>Résultats</a:t>
             </a:r>
             <a:endParaRPr lang="en-US" dirty="0"/>
           </a:p>
         </p:txBody>
       </p:sp>
+      <p:graphicFrame>
+        <p:nvGraphicFramePr>
+          <p:cNvPr id="3" name="Table 2"/>
+          <p:cNvGraphicFramePr>
+            <a:graphicFrameLocks noGrp="1"/>
+          </p:cNvGraphicFramePr>
+          <p:nvPr>
+            <p:extLst>
+              <p:ext uri="{D42A27DB-BD31-4B8C-83A1-F6EECF244321}">
+                <p14:modId xmlns:p14="http://schemas.microsoft.com/office/powerpoint/2010/main" val="3839855374"/>
+              </p:ext>
+            </p:extLst>
+          </p:nvPr>
+        </p:nvGraphicFramePr>
+        <p:xfrm>
+          <a:off x="6414020" y="1425162"/>
+          <a:ext cx="5355191" cy="3977640"/>
+        </p:xfrm>
+        <a:graphic>
+          <a:graphicData uri="http://schemas.openxmlformats.org/drawingml/2006/table">
+            <a:tbl>
+              <a:tblPr firstRow="1" bandRow="1">
+                <a:tableStyleId>{5C22544A-7EE6-4342-B048-85BDC9FD1C3A}</a:tableStyleId>
+              </a:tblPr>
+              <a:tblGrid>
+                <a:gridCol w="1075835">
+                  <a:extLst>
+                    <a:ext uri="{9D8B030D-6E8A-4147-A177-3AD203B41FA5}">
+                      <a16:colId xmlns:a16="http://schemas.microsoft.com/office/drawing/2014/main" val="20000"/>
+                    </a:ext>
+                  </a:extLst>
+                </a:gridCol>
+                <a:gridCol w="1560601">
+                  <a:extLst>
+                    <a:ext uri="{9D8B030D-6E8A-4147-A177-3AD203B41FA5}">
+                      <a16:colId xmlns:a16="http://schemas.microsoft.com/office/drawing/2014/main" val="20001"/>
+                    </a:ext>
+                  </a:extLst>
+                </a:gridCol>
+                <a:gridCol w="2718755">
+                  <a:extLst>
+                    <a:ext uri="{9D8B030D-6E8A-4147-A177-3AD203B41FA5}">
+                      <a16:colId xmlns:a16="http://schemas.microsoft.com/office/drawing/2014/main" val="20002"/>
+                    </a:ext>
+                  </a:extLst>
+                </a:gridCol>
+              </a:tblGrid>
+              <a:tr h="370840">
+                <a:tc>
+                  <a:txBody>
+                    <a:bodyPr/>
+                    <a:lstStyle/>
+                    <a:p>
+                      <a:pPr algn="ctr"/>
+                      <a:r>
+                        <a:rPr lang="en-US" dirty="0" smtClean="0"/>
+                        <a:t>Instance</a:t>
+                      </a:r>
+                    </a:p>
+                    <a:p>
+                      <a:pPr algn="ctr"/>
+                      <a:r>
+                        <a:rPr lang="en-US" dirty="0" smtClean="0"/>
+                        <a:t>(</a:t>
+                      </a:r>
+                      <a:r>
+                        <a:rPr lang="en-US" dirty="0" err="1" smtClean="0"/>
+                        <a:t>fichier</a:t>
+                      </a:r>
+                      <a:r>
+                        <a:rPr lang="en-US" dirty="0" smtClean="0"/>
+                        <a:t>)</a:t>
+                      </a:r>
+                      <a:endParaRPr lang="en-US" dirty="0"/>
+                    </a:p>
+                  </a:txBody>
+                  <a:tcPr/>
+                </a:tc>
+                <a:tc>
+                  <a:txBody>
+                    <a:bodyPr/>
+                    <a:lstStyle/>
+                    <a:p>
+                      <a:pPr algn="ctr"/>
+                      <a:r>
+                        <a:rPr lang="en-US" dirty="0" err="1" smtClean="0"/>
+                        <a:t>Durée</a:t>
+                      </a:r>
+                      <a:r>
+                        <a:rPr lang="en-US" dirty="0" smtClean="0"/>
+                        <a:t> max</a:t>
+                      </a:r>
+                      <a:endParaRPr lang="en-US" baseline="0" dirty="0" smtClean="0"/>
+                    </a:p>
+                    <a:p>
+                      <a:pPr algn="ctr"/>
+                      <a:r>
+                        <a:rPr lang="en-US" baseline="0" dirty="0" smtClean="0"/>
+                        <a:t>(</a:t>
+                      </a:r>
+                      <a:r>
+                        <a:rPr lang="en-US" baseline="0" dirty="0" err="1" smtClean="0"/>
+                        <a:t>en</a:t>
+                      </a:r>
+                      <a:r>
+                        <a:rPr lang="en-US" baseline="0" dirty="0" smtClean="0"/>
+                        <a:t> </a:t>
+                      </a:r>
+                      <a:r>
+                        <a:rPr lang="en-US" baseline="0" dirty="0" err="1" smtClean="0"/>
+                        <a:t>secondes</a:t>
+                      </a:r>
+                      <a:r>
+                        <a:rPr lang="en-US" baseline="0" dirty="0" smtClean="0"/>
+                        <a:t>)</a:t>
+                      </a:r>
+                      <a:endParaRPr lang="en-US" dirty="0"/>
+                    </a:p>
+                  </a:txBody>
+                  <a:tcPr/>
+                </a:tc>
+                <a:tc>
+                  <a:txBody>
+                    <a:bodyPr/>
+                    <a:lstStyle/>
+                    <a:p>
+                      <a:pPr algn="ctr"/>
+                      <a:r>
+                        <a:rPr lang="en-US" dirty="0" err="1" smtClean="0"/>
+                        <a:t>Ecart</a:t>
+                      </a:r>
+                      <a:r>
+                        <a:rPr lang="en-US" dirty="0" smtClean="0"/>
+                        <a:t> </a:t>
+                      </a:r>
+                      <a:r>
+                        <a:rPr lang="en-US" dirty="0" err="1" smtClean="0"/>
+                        <a:t>moyen</a:t>
+                      </a:r>
+                      <a:r>
+                        <a:rPr lang="en-US" baseline="0" dirty="0" smtClean="0"/>
+                        <a:t> optimum</a:t>
+                      </a:r>
+                    </a:p>
+                    <a:p>
+                      <a:pPr algn="ctr"/>
+                      <a:r>
+                        <a:rPr lang="en-US" baseline="0" dirty="0" smtClean="0"/>
+                        <a:t>(</a:t>
+                      </a:r>
+                      <a:r>
+                        <a:rPr lang="en-US" baseline="0" dirty="0" err="1" smtClean="0"/>
+                        <a:t>en</a:t>
+                      </a:r>
+                      <a:r>
+                        <a:rPr lang="en-US" baseline="0" dirty="0" smtClean="0"/>
+                        <a:t> %)</a:t>
+                      </a:r>
+                      <a:endParaRPr lang="en-US" dirty="0"/>
+                    </a:p>
+                  </a:txBody>
+                  <a:tcPr/>
+                </a:tc>
+                <a:extLst>
+                  <a:ext uri="{0D108BD9-81ED-4DB2-BD59-A6C34878D82A}">
+                    <a16:rowId xmlns:a16="http://schemas.microsoft.com/office/drawing/2014/main" val="10000"/>
+                  </a:ext>
+                </a:extLst>
+              </a:tr>
+              <a:tr h="370840">
+                <a:tc>
+                  <a:txBody>
+                    <a:bodyPr/>
+                    <a:lstStyle/>
+                    <a:p>
+                      <a:pPr algn="ctr"/>
+                      <a:r>
+                        <a:rPr lang="en-US" sz="1600" dirty="0" smtClean="0"/>
+                        <a:t>zi929</a:t>
+                      </a:r>
+                      <a:endParaRPr lang="en-US" sz="1600" dirty="0"/>
+                    </a:p>
+                  </a:txBody>
+                  <a:tcPr/>
+                </a:tc>
+                <a:tc>
+                  <a:txBody>
+                    <a:bodyPr/>
+                    <a:lstStyle/>
+                    <a:p>
+                      <a:pPr algn="ctr"/>
+                      <a:r>
+                        <a:rPr lang="en-US" sz="1600" dirty="0" smtClean="0"/>
+                        <a:t>10</a:t>
+                      </a:r>
+                      <a:endParaRPr lang="en-US" sz="1600" dirty="0"/>
+                    </a:p>
+                  </a:txBody>
+                  <a:tcPr/>
+                </a:tc>
+                <a:tc>
+                  <a:txBody>
+                    <a:bodyPr/>
+                    <a:lstStyle/>
+                    <a:p>
+                      <a:pPr algn="ctr"/>
+                      <a:r>
+                        <a:rPr lang="en-US" sz="1600" dirty="0" smtClean="0"/>
+                        <a:t>22.77</a:t>
+                      </a:r>
+                      <a:endParaRPr lang="en-US" sz="1600" dirty="0"/>
+                    </a:p>
+                  </a:txBody>
+                  <a:tcPr/>
+                </a:tc>
+                <a:extLst>
+                  <a:ext uri="{0D108BD9-81ED-4DB2-BD59-A6C34878D82A}">
+                    <a16:rowId xmlns:a16="http://schemas.microsoft.com/office/drawing/2014/main" val="2808459390"/>
+                  </a:ext>
+                </a:extLst>
+              </a:tr>
+              <a:tr h="370840">
+                <a:tc>
+                  <a:txBody>
+                    <a:bodyPr/>
+                    <a:lstStyle/>
+                    <a:p>
+                      <a:pPr algn="ctr"/>
+                      <a:r>
+                        <a:rPr lang="en-US" sz="1600" dirty="0" smtClean="0"/>
+                        <a:t>zi929</a:t>
+                      </a:r>
+                      <a:endParaRPr lang="en-US" sz="1600" dirty="0"/>
+                    </a:p>
+                  </a:txBody>
+                  <a:tcPr/>
+                </a:tc>
+                <a:tc>
+                  <a:txBody>
+                    <a:bodyPr/>
+                    <a:lstStyle/>
+                    <a:p>
+                      <a:pPr algn="ctr"/>
+                      <a:r>
+                        <a:rPr lang="en-US" sz="1600" dirty="0" smtClean="0"/>
+                        <a:t>20</a:t>
+                      </a:r>
+                      <a:endParaRPr lang="en-US" sz="1600" dirty="0"/>
+                    </a:p>
+                  </a:txBody>
+                  <a:tcPr/>
+                </a:tc>
+                <a:tc>
+                  <a:txBody>
+                    <a:bodyPr/>
+                    <a:lstStyle/>
+                    <a:p>
+                      <a:pPr algn="ctr"/>
+                      <a:r>
+                        <a:rPr lang="en-US" sz="1600" dirty="0" smtClean="0"/>
+                        <a:t>22.70</a:t>
+                      </a:r>
+                      <a:endParaRPr lang="en-US" sz="1600" dirty="0"/>
+                    </a:p>
+                  </a:txBody>
+                  <a:tcPr/>
+                </a:tc>
+                <a:extLst>
+                  <a:ext uri="{0D108BD9-81ED-4DB2-BD59-A6C34878D82A}">
+                    <a16:rowId xmlns:a16="http://schemas.microsoft.com/office/drawing/2014/main" val="10001"/>
+                  </a:ext>
+                </a:extLst>
+              </a:tr>
+              <a:tr h="370840">
+                <a:tc>
+                  <a:txBody>
+                    <a:bodyPr/>
+                    <a:lstStyle/>
+                    <a:p>
+                      <a:pPr algn="ctr"/>
+                      <a:r>
+                        <a:rPr lang="en-US" sz="1600" dirty="0" smtClean="0"/>
+                        <a:t>zi929</a:t>
+                      </a:r>
+                      <a:endParaRPr lang="en-US" sz="1600" dirty="0"/>
+                    </a:p>
+                  </a:txBody>
+                  <a:tcPr/>
+                </a:tc>
+                <a:tc>
+                  <a:txBody>
+                    <a:bodyPr/>
+                    <a:lstStyle/>
+                    <a:p>
+                      <a:pPr algn="ctr"/>
+                      <a:r>
+                        <a:rPr lang="en-US" sz="1600" dirty="0" smtClean="0"/>
+                        <a:t>40</a:t>
+                      </a:r>
+                      <a:endParaRPr lang="en-US" sz="1600" dirty="0"/>
+                    </a:p>
+                  </a:txBody>
+                  <a:tcPr/>
+                </a:tc>
+                <a:tc>
+                  <a:txBody>
+                    <a:bodyPr/>
+                    <a:lstStyle/>
+                    <a:p>
+                      <a:pPr algn="ctr"/>
+                      <a:r>
+                        <a:rPr lang="en-US" sz="1600" dirty="0" smtClean="0"/>
+                        <a:t>22.68</a:t>
+                      </a:r>
+                      <a:endParaRPr lang="en-US" sz="1600" dirty="0"/>
+                    </a:p>
+                  </a:txBody>
+                  <a:tcPr/>
+                </a:tc>
+                <a:extLst>
+                  <a:ext uri="{0D108BD9-81ED-4DB2-BD59-A6C34878D82A}">
+                    <a16:rowId xmlns:a16="http://schemas.microsoft.com/office/drawing/2014/main" val="1361785963"/>
+                  </a:ext>
+                </a:extLst>
+              </a:tr>
+              <a:tr h="370840">
+                <a:tc>
+                  <a:txBody>
+                    <a:bodyPr/>
+                    <a:lstStyle/>
+                    <a:p>
+                      <a:pPr algn="ctr"/>
+                      <a:r>
+                        <a:rPr lang="en-US" sz="1600" dirty="0" smtClean="0"/>
+                        <a:t>lu980</a:t>
+                      </a:r>
+                      <a:endParaRPr lang="en-US" sz="1600" dirty="0"/>
+                    </a:p>
+                  </a:txBody>
+                  <a:tcPr/>
+                </a:tc>
+                <a:tc>
+                  <a:txBody>
+                    <a:bodyPr/>
+                    <a:lstStyle/>
+                    <a:p>
+                      <a:pPr algn="ctr"/>
+                      <a:r>
+                        <a:rPr lang="en-US" sz="1600" dirty="0" smtClean="0"/>
+                        <a:t>10</a:t>
+                      </a:r>
+                      <a:endParaRPr lang="en-US" sz="1600" dirty="0"/>
+                    </a:p>
+                  </a:txBody>
+                  <a:tcPr/>
+                </a:tc>
+                <a:tc>
+                  <a:txBody>
+                    <a:bodyPr/>
+                    <a:lstStyle/>
+                    <a:p>
+                      <a:pPr algn="ctr"/>
+                      <a:r>
+                        <a:rPr lang="en-US" sz="1600" dirty="0" smtClean="0"/>
+                        <a:t>23.23</a:t>
+                      </a:r>
+                      <a:endParaRPr lang="en-US" sz="1600" dirty="0"/>
+                    </a:p>
+                  </a:txBody>
+                  <a:tcPr/>
+                </a:tc>
+                <a:extLst>
+                  <a:ext uri="{0D108BD9-81ED-4DB2-BD59-A6C34878D82A}">
+                    <a16:rowId xmlns:a16="http://schemas.microsoft.com/office/drawing/2014/main" val="10002"/>
+                  </a:ext>
+                </a:extLst>
+              </a:tr>
+              <a:tr h="370840">
+                <a:tc>
+                  <a:txBody>
+                    <a:bodyPr/>
+                    <a:lstStyle/>
+                    <a:p>
+                      <a:pPr algn="ctr"/>
+                      <a:r>
+                        <a:rPr lang="en-US" sz="1600" dirty="0" smtClean="0"/>
+                        <a:t>lu980</a:t>
+                      </a:r>
+                      <a:endParaRPr lang="en-US" sz="1600" dirty="0"/>
+                    </a:p>
+                  </a:txBody>
+                  <a:tcPr/>
+                </a:tc>
+                <a:tc>
+                  <a:txBody>
+                    <a:bodyPr/>
+                    <a:lstStyle/>
+                    <a:p>
+                      <a:pPr algn="ctr"/>
+                      <a:r>
+                        <a:rPr lang="en-US" sz="1600" dirty="0" smtClean="0"/>
+                        <a:t>20</a:t>
+                      </a:r>
+                      <a:endParaRPr lang="en-US" sz="1600" dirty="0"/>
+                    </a:p>
+                  </a:txBody>
+                  <a:tcPr/>
+                </a:tc>
+                <a:tc>
+                  <a:txBody>
+                    <a:bodyPr/>
+                    <a:lstStyle/>
+                    <a:p>
+                      <a:pPr algn="ctr"/>
+                      <a:r>
+                        <a:rPr lang="en-US" sz="1600" dirty="0" smtClean="0"/>
+                        <a:t>25.23</a:t>
+                      </a:r>
+                      <a:endParaRPr lang="en-US" sz="1600" dirty="0"/>
+                    </a:p>
+                  </a:txBody>
+                  <a:tcPr/>
+                </a:tc>
+                <a:extLst>
+                  <a:ext uri="{0D108BD9-81ED-4DB2-BD59-A6C34878D82A}">
+                    <a16:rowId xmlns:a16="http://schemas.microsoft.com/office/drawing/2014/main" val="10003"/>
+                  </a:ext>
+                </a:extLst>
+              </a:tr>
+              <a:tr h="370840">
+                <a:tc>
+                  <a:txBody>
+                    <a:bodyPr/>
+                    <a:lstStyle/>
+                    <a:p>
+                      <a:pPr algn="ctr"/>
+                      <a:r>
+                        <a:rPr lang="en-US" sz="1600" dirty="0" smtClean="0"/>
+                        <a:t>lu980</a:t>
+                      </a:r>
+                      <a:endParaRPr lang="en-US" sz="1600" dirty="0"/>
+                    </a:p>
+                  </a:txBody>
+                  <a:tcPr/>
+                </a:tc>
+                <a:tc>
+                  <a:txBody>
+                    <a:bodyPr/>
+                    <a:lstStyle/>
+                    <a:p>
+                      <a:pPr algn="ctr"/>
+                      <a:r>
+                        <a:rPr lang="en-US" sz="1600" dirty="0" smtClean="0"/>
+                        <a:t>40</a:t>
+                      </a:r>
+                      <a:endParaRPr lang="en-US" sz="1600" dirty="0"/>
+                    </a:p>
+                  </a:txBody>
+                  <a:tcPr/>
+                </a:tc>
+                <a:tc>
+                  <a:txBody>
+                    <a:bodyPr/>
+                    <a:lstStyle/>
+                    <a:p>
+                      <a:pPr algn="ctr"/>
+                      <a:r>
+                        <a:rPr lang="en-US" sz="1600" dirty="0" smtClean="0"/>
+                        <a:t>24.90</a:t>
+                      </a:r>
+                      <a:endParaRPr lang="en-US" sz="1600" dirty="0"/>
+                    </a:p>
+                  </a:txBody>
+                  <a:tcPr/>
+                </a:tc>
+                <a:extLst>
+                  <a:ext uri="{0D108BD9-81ED-4DB2-BD59-A6C34878D82A}">
+                    <a16:rowId xmlns:a16="http://schemas.microsoft.com/office/drawing/2014/main" val="1527334627"/>
+                  </a:ext>
+                </a:extLst>
+              </a:tr>
+              <a:tr h="370840">
+                <a:tc>
+                  <a:txBody>
+                    <a:bodyPr/>
+                    <a:lstStyle/>
+                    <a:p>
+                      <a:pPr algn="ctr"/>
+                      <a:r>
+                        <a:rPr lang="en-US" sz="1600" dirty="0" smtClean="0"/>
+                        <a:t>mu1979</a:t>
+                      </a:r>
+                      <a:endParaRPr lang="en-US" sz="1600" dirty="0"/>
+                    </a:p>
+                  </a:txBody>
+                  <a:tcPr/>
+                </a:tc>
+                <a:tc>
+                  <a:txBody>
+                    <a:bodyPr/>
+                    <a:lstStyle/>
+                    <a:p>
+                      <a:pPr algn="ctr"/>
+                      <a:r>
+                        <a:rPr lang="en-US" sz="1600" dirty="0" smtClean="0"/>
+                        <a:t>10</a:t>
+                      </a:r>
+                      <a:endParaRPr lang="en-US" sz="1600" dirty="0"/>
+                    </a:p>
+                  </a:txBody>
+                  <a:tcPr/>
+                </a:tc>
+                <a:tc>
+                  <a:txBody>
+                    <a:bodyPr/>
+                    <a:lstStyle/>
+                    <a:p>
+                      <a:pPr algn="ctr"/>
+                      <a:r>
+                        <a:rPr lang="en-US" sz="1600" dirty="0" smtClean="0"/>
+                        <a:t>61.99</a:t>
+                      </a:r>
+                      <a:endParaRPr lang="en-US" sz="1600" dirty="0"/>
+                    </a:p>
+                  </a:txBody>
+                  <a:tcPr/>
+                </a:tc>
+                <a:extLst>
+                  <a:ext uri="{0D108BD9-81ED-4DB2-BD59-A6C34878D82A}">
+                    <a16:rowId xmlns:a16="http://schemas.microsoft.com/office/drawing/2014/main" val="3792653972"/>
+                  </a:ext>
+                </a:extLst>
+              </a:tr>
+              <a:tr h="370840">
+                <a:tc>
+                  <a:txBody>
+                    <a:bodyPr/>
+                    <a:lstStyle/>
+                    <a:p>
+                      <a:pPr algn="ctr"/>
+                      <a:r>
+                        <a:rPr lang="en-US" sz="1600" dirty="0" smtClean="0"/>
+                        <a:t>mu1979</a:t>
+                      </a:r>
+                      <a:endParaRPr lang="en-US" sz="1600" dirty="0"/>
+                    </a:p>
+                  </a:txBody>
+                  <a:tcPr/>
+                </a:tc>
+                <a:tc>
+                  <a:txBody>
+                    <a:bodyPr/>
+                    <a:lstStyle/>
+                    <a:p>
+                      <a:pPr algn="ctr"/>
+                      <a:r>
+                        <a:rPr lang="en-US" sz="1600" dirty="0" smtClean="0"/>
+                        <a:t>20</a:t>
+                      </a:r>
+                      <a:endParaRPr lang="en-US" sz="1600" dirty="0"/>
+                    </a:p>
+                  </a:txBody>
+                  <a:tcPr/>
+                </a:tc>
+                <a:tc>
+                  <a:txBody>
+                    <a:bodyPr/>
+                    <a:lstStyle/>
+                    <a:p>
+                      <a:pPr algn="ctr"/>
+                      <a:r>
+                        <a:rPr lang="en-US" sz="1600" dirty="0" smtClean="0"/>
+                        <a:t>61.97</a:t>
+                      </a:r>
+                      <a:endParaRPr lang="en-US" sz="1600" dirty="0"/>
+                    </a:p>
+                  </a:txBody>
+                  <a:tcPr/>
+                </a:tc>
+                <a:extLst>
+                  <a:ext uri="{0D108BD9-81ED-4DB2-BD59-A6C34878D82A}">
+                    <a16:rowId xmlns:a16="http://schemas.microsoft.com/office/drawing/2014/main" val="2943019833"/>
+                  </a:ext>
+                </a:extLst>
+              </a:tr>
+              <a:tr h="370840">
+                <a:tc>
+                  <a:txBody>
+                    <a:bodyPr/>
+                    <a:lstStyle/>
+                    <a:p>
+                      <a:pPr algn="ctr"/>
+                      <a:r>
+                        <a:rPr lang="en-US" sz="1600" dirty="0" smtClean="0"/>
+                        <a:t>mu1979</a:t>
+                      </a:r>
+                      <a:endParaRPr lang="en-US" sz="1600" dirty="0"/>
+                    </a:p>
+                  </a:txBody>
+                  <a:tcPr/>
+                </a:tc>
+                <a:tc>
+                  <a:txBody>
+                    <a:bodyPr/>
+                    <a:lstStyle/>
+                    <a:p>
+                      <a:pPr algn="ctr"/>
+                      <a:r>
+                        <a:rPr lang="en-US" sz="1600" dirty="0" smtClean="0"/>
+                        <a:t>40</a:t>
+                      </a:r>
+                      <a:endParaRPr lang="en-US" sz="1600" dirty="0"/>
+                    </a:p>
+                  </a:txBody>
+                  <a:tcPr/>
+                </a:tc>
+                <a:tc>
+                  <a:txBody>
+                    <a:bodyPr/>
+                    <a:lstStyle/>
+                    <a:p>
+                      <a:pPr algn="ctr"/>
+                      <a:r>
+                        <a:rPr lang="en-US" sz="1600" dirty="0" smtClean="0"/>
+                        <a:t>61.27</a:t>
+                      </a:r>
+                      <a:endParaRPr lang="en-US" sz="1600" dirty="0"/>
+                    </a:p>
+                  </a:txBody>
+                  <a:tcPr/>
+                </a:tc>
+                <a:extLst>
+                  <a:ext uri="{0D108BD9-81ED-4DB2-BD59-A6C34878D82A}">
+                    <a16:rowId xmlns:a16="http://schemas.microsoft.com/office/drawing/2014/main" val="3543114398"/>
+                  </a:ext>
+                </a:extLst>
+              </a:tr>
+            </a:tbl>
+          </a:graphicData>
+        </a:graphic>
+      </p:graphicFrame>
       <p:sp>
         <p:nvSpPr>
           <p:cNvPr id="8" name="TextBox 7"/>
@@ -11109,8 +11915,8 @@
         </p:nvSpPr>
         <p:spPr>
           <a:xfrm>
-            <a:off x="384916" y="4928576"/>
-            <a:ext cx="11375296" cy="923330"/>
+            <a:off x="117248" y="1705382"/>
+            <a:ext cx="5973836" cy="1200329"/>
           </a:xfrm>
           <a:prstGeom prst="rect">
             <a:avLst/>
@@ -11123,65 +11929,175 @@
           </a:bodyPr>
           <a:lstStyle/>
           <a:p>
-            <a:pPr marL="285750" indent="-285750">
+            <a:pPr marL="285750" indent="-285750" algn="just">
               <a:buFont typeface="Arial" charset="0"/>
               <a:buChar char="•"/>
             </a:pPr>
             <a:r>
               <a:rPr lang="en-US" dirty="0" smtClean="0"/>
-              <a:t>Select one or two instances</a:t>
+              <a:t>A </a:t>
+            </a:r>
+            <a:r>
+              <a:rPr lang="en-US" dirty="0" err="1"/>
+              <a:t>partir</a:t>
+            </a:r>
+            <a:r>
+              <a:rPr lang="en-US" dirty="0"/>
+              <a:t> de </a:t>
+            </a:r>
+            <a:r>
+              <a:rPr lang="en-US" dirty="0" err="1"/>
+              <a:t>l’échantillon</a:t>
+            </a:r>
+            <a:r>
+              <a:rPr lang="en-US" dirty="0"/>
+              <a:t> </a:t>
+            </a:r>
+            <a:r>
+              <a:rPr lang="en-US" i="1" dirty="0"/>
+              <a:t>nu3496</a:t>
+            </a:r>
+            <a:r>
+              <a:rPr lang="en-US" dirty="0"/>
+              <a:t>, le </a:t>
+            </a:r>
+            <a:r>
+              <a:rPr lang="en-US" dirty="0" err="1"/>
+              <a:t>programme</a:t>
+            </a:r>
+            <a:r>
+              <a:rPr lang="en-US" dirty="0"/>
+              <a:t> </a:t>
+            </a:r>
+            <a:r>
+              <a:rPr lang="en-US" dirty="0" err="1"/>
+              <a:t>n’a</a:t>
+            </a:r>
+            <a:r>
+              <a:rPr lang="en-US" dirty="0"/>
+              <a:t> plus </a:t>
+            </a:r>
+            <a:r>
+              <a:rPr lang="en-US" dirty="0" err="1"/>
+              <a:t>assez</a:t>
+            </a:r>
+            <a:r>
+              <a:rPr lang="en-US" dirty="0"/>
+              <a:t> de temps pour </a:t>
+            </a:r>
+            <a:r>
+              <a:rPr lang="en-US" dirty="0" err="1"/>
+              <a:t>terminer</a:t>
+            </a:r>
+            <a:r>
+              <a:rPr lang="en-US" dirty="0"/>
+              <a:t> les </a:t>
+            </a:r>
+            <a:r>
+              <a:rPr lang="en-US" dirty="0" err="1"/>
+              <a:t>calculs</a:t>
+            </a:r>
+            <a:r>
+              <a:rPr lang="en-US" dirty="0"/>
+              <a:t> : </a:t>
+            </a:r>
+            <a:r>
+              <a:rPr lang="en-US" dirty="0" err="1"/>
+              <a:t>une</a:t>
+            </a:r>
+            <a:r>
+              <a:rPr lang="en-US" dirty="0"/>
+              <a:t> exception </a:t>
+            </a:r>
+            <a:r>
+              <a:rPr lang="en-US" dirty="0" err="1"/>
+              <a:t>est</a:t>
+            </a:r>
+            <a:r>
+              <a:rPr lang="en-US" dirty="0"/>
+              <a:t> levee </a:t>
+            </a:r>
+            <a:r>
+              <a:rPr lang="en-US" dirty="0" smtClean="0"/>
+              <a:t>(</a:t>
+            </a:r>
+            <a:r>
+              <a:rPr lang="en-US" dirty="0" err="1" smtClean="0"/>
+              <a:t>voir</a:t>
+            </a:r>
+            <a:r>
+              <a:rPr lang="en-US" dirty="0" smtClean="0"/>
+              <a:t> </a:t>
+            </a:r>
+            <a:r>
+              <a:rPr lang="en-US" dirty="0" err="1" smtClean="0"/>
+              <a:t>l’image</a:t>
+            </a:r>
+            <a:r>
+              <a:rPr lang="en-US" dirty="0" smtClean="0"/>
+              <a:t> ci-</a:t>
+            </a:r>
+            <a:r>
+              <a:rPr lang="en-US" dirty="0" err="1" smtClean="0"/>
+              <a:t>dessous</a:t>
+            </a:r>
+            <a:r>
+              <a:rPr lang="en-US" dirty="0" smtClean="0"/>
+              <a:t>).</a:t>
             </a:r>
           </a:p>
           <a:p>
-            <a:pPr marL="285750" indent="-285750">
+            <a:pPr marL="285750" indent="-285750" algn="just">
               <a:buFont typeface="Arial" charset="0"/>
               <a:buChar char="•"/>
             </a:pPr>
             <a:r>
               <a:rPr lang="en-US" dirty="0" smtClean="0"/>
-              <a:t>Run your algorithm for 60 s with different parameters (e.g., # of threads, # of tasks)</a:t>
-            </a:r>
-          </a:p>
-          <a:p>
-            <a:pPr marL="285750" indent="-285750">
-              <a:buFont typeface="Arial" charset="0"/>
-              <a:buChar char="•"/>
-            </a:pPr>
-            <a:r>
-              <a:rPr lang="en-US" dirty="0" smtClean="0"/>
-              <a:t>Build a chart showing the change on the gap with respect to the change of parameters (see the example above)</a:t>
+              <a:t>Idem </a:t>
+            </a:r>
+            <a:r>
+              <a:rPr lang="en-US" dirty="0"/>
+              <a:t>pour les instances de plus de 3496 </a:t>
+            </a:r>
+            <a:r>
+              <a:rPr lang="en-US" dirty="0" err="1"/>
+              <a:t>villes</a:t>
+            </a:r>
+            <a:r>
+              <a:rPr lang="en-US" dirty="0"/>
+              <a:t>.</a:t>
             </a:r>
           </a:p>
         </p:txBody>
       </p:sp>
-      <p:graphicFrame>
-        <p:nvGraphicFramePr>
-          <p:cNvPr id="10" name="Chart 9"/>
-          <p:cNvGraphicFramePr>
-            <a:graphicFrameLocks/>
-          </p:cNvGraphicFramePr>
-          <p:nvPr>
-            <p:extLst>
-              <p:ext uri="{D42A27DB-BD31-4B8C-83A1-F6EECF244321}">
-                <p14:modId xmlns:p14="http://schemas.microsoft.com/office/powerpoint/2010/main" xmlns="" val="1882126371"/>
-              </p:ext>
-            </p:extLst>
-          </p:nvPr>
-        </p:nvGraphicFramePr>
-        <p:xfrm>
-          <a:off x="2115136" y="1120204"/>
-          <a:ext cx="8176728" cy="3412886"/>
-        </p:xfrm>
-        <a:graphic>
-          <a:graphicData uri="http://schemas.openxmlformats.org/drawingml/2006/chart">
-            <c:chart xmlns:c="http://schemas.openxmlformats.org/drawingml/2006/chart" xmlns:r="http://schemas.openxmlformats.org/officeDocument/2006/relationships" r:id="rId2"/>
-          </a:graphicData>
-        </a:graphic>
-      </p:graphicFrame>
+      <p:pic>
+        <p:nvPicPr>
+          <p:cNvPr id="2" name="Image 1"/>
+          <p:cNvPicPr>
+            <a:picLocks noChangeAspect="1"/>
+          </p:cNvPicPr>
+          <p:nvPr/>
+        </p:nvPicPr>
+        <p:blipFill>
+          <a:blip r:embed="rId2"/>
+          <a:stretch>
+            <a:fillRect/>
+          </a:stretch>
+        </p:blipFill>
+        <p:spPr>
+          <a:xfrm>
+            <a:off x="198733" y="3925288"/>
+            <a:ext cx="5892351" cy="1177909"/>
+          </a:xfrm>
+          <a:prstGeom prst="rect">
+            <a:avLst/>
+          </a:prstGeom>
+        </p:spPr>
+      </p:pic>
     </p:spTree>
     <p:extLst>
       <p:ext uri="{BB962C8B-B14F-4D97-AF65-F5344CB8AC3E}">
-        <p14:creationId xmlns:p14="http://schemas.microsoft.com/office/powerpoint/2010/main" xmlns="" val="44227942"/>
+        <p14:creationId xmlns:p14="http://schemas.microsoft.com/office/powerpoint/2010/main" val="1879248739"/>
       </p:ext>
     </p:extLst>
   </p:cSld>
@@ -11217,6 +12133,143 @@
       </p:grpSpPr>
       <p:sp>
         <p:nvSpPr>
+          <p:cNvPr id="5" name="Titre 4"/>
+          <p:cNvSpPr>
+            <a:spLocks noGrp="1"/>
+          </p:cNvSpPr>
+          <p:nvPr>
+            <p:ph type="title"/>
+          </p:nvPr>
+        </p:nvSpPr>
+        <p:spPr/>
+        <p:txBody>
+          <a:bodyPr/>
+          <a:lstStyle/>
+          <a:p>
+            <a:r>
+              <a:rPr lang="en-US" dirty="0" smtClean="0"/>
+              <a:t>Results (2 slides)</a:t>
+            </a:r>
+            <a:endParaRPr lang="en-US" dirty="0"/>
+          </a:p>
+        </p:txBody>
+      </p:sp>
+      <p:sp>
+        <p:nvSpPr>
+          <p:cNvPr id="8" name="TextBox 7"/>
+          <p:cNvSpPr txBox="1"/>
+          <p:nvPr/>
+        </p:nvSpPr>
+        <p:spPr>
+          <a:xfrm>
+            <a:off x="384916" y="4928576"/>
+            <a:ext cx="11375296" cy="923330"/>
+          </a:xfrm>
+          <a:prstGeom prst="rect">
+            <a:avLst/>
+          </a:prstGeom>
+          <a:noFill/>
+        </p:spPr>
+        <p:txBody>
+          <a:bodyPr wrap="square" rtlCol="0">
+            <a:spAutoFit/>
+          </a:bodyPr>
+          <a:lstStyle/>
+          <a:p>
+            <a:pPr marL="285750" indent="-285750">
+              <a:buFont typeface="Arial" charset="0"/>
+              <a:buChar char="•"/>
+            </a:pPr>
+            <a:r>
+              <a:rPr lang="en-US" dirty="0" smtClean="0"/>
+              <a:t>Select one or two instances</a:t>
+            </a:r>
+          </a:p>
+          <a:p>
+            <a:pPr marL="285750" indent="-285750">
+              <a:buFont typeface="Arial" charset="0"/>
+              <a:buChar char="•"/>
+            </a:pPr>
+            <a:r>
+              <a:rPr lang="en-US" dirty="0" smtClean="0"/>
+              <a:t>Run your algorithm for 60 s with different parameters (e.g., # of threads, # of tasks)</a:t>
+            </a:r>
+          </a:p>
+          <a:p>
+            <a:pPr marL="285750" indent="-285750">
+              <a:buFont typeface="Arial" charset="0"/>
+              <a:buChar char="•"/>
+            </a:pPr>
+            <a:r>
+              <a:rPr lang="en-US" dirty="0" smtClean="0"/>
+              <a:t>Build a chart showing the change on the gap with respect to the change of parameters (see the example above)</a:t>
+            </a:r>
+          </a:p>
+        </p:txBody>
+      </p:sp>
+      <p:graphicFrame>
+        <p:nvGraphicFramePr>
+          <p:cNvPr id="10" name="Chart 9"/>
+          <p:cNvGraphicFramePr>
+            <a:graphicFrameLocks/>
+          </p:cNvGraphicFramePr>
+          <p:nvPr>
+            <p:extLst>
+              <p:ext uri="{D42A27DB-BD31-4B8C-83A1-F6EECF244321}">
+                <p14:modId xmlns:p14="http://schemas.microsoft.com/office/powerpoint/2010/main" val="1882126371"/>
+              </p:ext>
+            </p:extLst>
+          </p:nvPr>
+        </p:nvGraphicFramePr>
+        <p:xfrm>
+          <a:off x="2115136" y="1120204"/>
+          <a:ext cx="8176728" cy="3412886"/>
+        </p:xfrm>
+        <a:graphic>
+          <a:graphicData uri="http://schemas.openxmlformats.org/drawingml/2006/chart">
+            <c:chart xmlns:c="http://schemas.openxmlformats.org/drawingml/2006/chart" xmlns:r="http://schemas.openxmlformats.org/officeDocument/2006/relationships" r:id="rId2"/>
+          </a:graphicData>
+        </a:graphic>
+      </p:graphicFrame>
+    </p:spTree>
+    <p:extLst>
+      <p:ext uri="{BB962C8B-B14F-4D97-AF65-F5344CB8AC3E}">
+        <p14:creationId xmlns:p14="http://schemas.microsoft.com/office/powerpoint/2010/main" val="44227942"/>
+      </p:ext>
+    </p:extLst>
+  </p:cSld>
+  <p:clrMapOvr>
+    <a:masterClrMapping/>
+  </p:clrMapOvr>
+  <p:timing>
+    <p:tnLst>
+      <p:par>
+        <p:cTn id="1" dur="indefinite" restart="never" nodeType="tmRoot"/>
+      </p:par>
+    </p:tnLst>
+  </p:timing>
+</p:sld>
+</file>
+
+<file path=ppt/slides/slide9.xml><?xml version="1.0" encoding="utf-8"?>
+<p:sld xmlns:a="http://schemas.openxmlformats.org/drawingml/2006/main" xmlns:r="http://schemas.openxmlformats.org/officeDocument/2006/relationships" xmlns:p="http://schemas.openxmlformats.org/presentationml/2006/main">
+  <p:cSld>
+    <p:spTree>
+      <p:nvGrpSpPr>
+        <p:cNvPr id="1" name=""/>
+        <p:cNvGrpSpPr/>
+        <p:nvPr/>
+      </p:nvGrpSpPr>
+      <p:grpSpPr>
+        <a:xfrm>
+          <a:off x="0" y="0"/>
+          <a:ext cx="0" cy="0"/>
+          <a:chOff x="0" y="0"/>
+          <a:chExt cx="0" cy="0"/>
+        </a:xfrm>
+      </p:grpSpPr>
+      <p:sp>
+        <p:nvSpPr>
           <p:cNvPr id="2" name="Text Placeholder 1"/>
           <p:cNvSpPr>
             <a:spLocks noGrp="1"/>
@@ -11275,7 +12328,7 @@
     </p:spTree>
     <p:extLst>
       <p:ext uri="{BB962C8B-B14F-4D97-AF65-F5344CB8AC3E}">
-        <p14:creationId xmlns:p14="http://schemas.microsoft.com/office/powerpoint/2010/main" xmlns="" val="894479036"/>
+        <p14:creationId xmlns:p14="http://schemas.microsoft.com/office/powerpoint/2010/main" val="894479036"/>
       </p:ext>
     </p:extLst>
   </p:cSld>

</xml_diff>